<commit_message>
Change sample ppt and update scripts
</commit_message>
<xml_diff>
--- a/src/Ejemplo.pptx
+++ b/src/Ejemplo.pptx
@@ -7,6 +7,7 @@
   <p:sldIdLst>
     <p:sldId id="256" r:id="rId2"/>
     <p:sldId id="257" r:id="rId3"/>
+    <p:sldId id="258" r:id="rId4"/>
   </p:sldIdLst>
   <p:sldSz cx="12192000" cy="6858000"/>
   <p:notesSz cx="6858000" cy="9144000"/>
@@ -105,7 +106,2634 @@
       </a:defRPr>
     </a:lvl9pPr>
   </p:defaultTextStyle>
+  <p:extLst>
+    <p:ext uri="{EFAFB233-063F-42B5-8137-9DF3F51BA10A}">
+      <p15:sldGuideLst xmlns:p15="http://schemas.microsoft.com/office/powerpoint/2012/main"/>
+    </p:ext>
+  </p:extLst>
 </p:presentation>
+</file>
+
+<file path=ppt/diagrams/colors1.xml><?xml version="1.0" encoding="utf-8"?>
+<dgm:colorsDef xmlns:dgm="http://schemas.openxmlformats.org/drawingml/2006/diagram" xmlns:a="http://schemas.openxmlformats.org/drawingml/2006/main" uniqueId="urn:microsoft.com/office/officeart/2005/8/colors/accent1_2">
+  <dgm:title val=""/>
+  <dgm:desc val=""/>
+  <dgm:catLst>
+    <dgm:cat type="accent1" pri="11200"/>
+  </dgm:catLst>
+  <dgm:styleLbl name="node0">
+    <dgm:fillClrLst meth="repeat">
+      <a:schemeClr val="accent1"/>
+    </dgm:fillClrLst>
+    <dgm:linClrLst meth="repeat">
+      <a:schemeClr val="lt1"/>
+    </dgm:linClrLst>
+    <dgm:effectClrLst/>
+    <dgm:txLinClrLst/>
+    <dgm:txFillClrLst/>
+    <dgm:txEffectClrLst/>
+  </dgm:styleLbl>
+  <dgm:styleLbl name="alignNode1">
+    <dgm:fillClrLst meth="repeat">
+      <a:schemeClr val="accent1"/>
+    </dgm:fillClrLst>
+    <dgm:linClrLst meth="repeat">
+      <a:schemeClr val="accent1"/>
+    </dgm:linClrLst>
+    <dgm:effectClrLst/>
+    <dgm:txLinClrLst/>
+    <dgm:txFillClrLst/>
+    <dgm:txEffectClrLst/>
+  </dgm:styleLbl>
+  <dgm:styleLbl name="node1">
+    <dgm:fillClrLst meth="repeat">
+      <a:schemeClr val="accent1"/>
+    </dgm:fillClrLst>
+    <dgm:linClrLst meth="repeat">
+      <a:schemeClr val="lt1"/>
+    </dgm:linClrLst>
+    <dgm:effectClrLst/>
+    <dgm:txLinClrLst/>
+    <dgm:txFillClrLst/>
+    <dgm:txEffectClrLst/>
+  </dgm:styleLbl>
+  <dgm:styleLbl name="lnNode1">
+    <dgm:fillClrLst meth="repeat">
+      <a:schemeClr val="accent1"/>
+    </dgm:fillClrLst>
+    <dgm:linClrLst meth="repeat">
+      <a:schemeClr val="lt1"/>
+    </dgm:linClrLst>
+    <dgm:effectClrLst/>
+    <dgm:txLinClrLst/>
+    <dgm:txFillClrLst/>
+    <dgm:txEffectClrLst/>
+  </dgm:styleLbl>
+  <dgm:styleLbl name="vennNode1">
+    <dgm:fillClrLst meth="repeat">
+      <a:schemeClr val="accent1">
+        <a:alpha val="50000"/>
+      </a:schemeClr>
+    </dgm:fillClrLst>
+    <dgm:linClrLst meth="repeat">
+      <a:schemeClr val="lt1"/>
+    </dgm:linClrLst>
+    <dgm:effectClrLst/>
+    <dgm:txLinClrLst/>
+    <dgm:txFillClrLst/>
+    <dgm:txEffectClrLst/>
+  </dgm:styleLbl>
+  <dgm:styleLbl name="node2">
+    <dgm:fillClrLst meth="repeat">
+      <a:schemeClr val="accent1"/>
+    </dgm:fillClrLst>
+    <dgm:linClrLst meth="repeat">
+      <a:schemeClr val="lt1"/>
+    </dgm:linClrLst>
+    <dgm:effectClrLst/>
+    <dgm:txLinClrLst/>
+    <dgm:txFillClrLst/>
+    <dgm:txEffectClrLst/>
+  </dgm:styleLbl>
+  <dgm:styleLbl name="node3">
+    <dgm:fillClrLst meth="repeat">
+      <a:schemeClr val="accent1"/>
+    </dgm:fillClrLst>
+    <dgm:linClrLst meth="repeat">
+      <a:schemeClr val="lt1"/>
+    </dgm:linClrLst>
+    <dgm:effectClrLst/>
+    <dgm:txLinClrLst/>
+    <dgm:txFillClrLst/>
+    <dgm:txEffectClrLst/>
+  </dgm:styleLbl>
+  <dgm:styleLbl name="node4">
+    <dgm:fillClrLst meth="repeat">
+      <a:schemeClr val="accent1"/>
+    </dgm:fillClrLst>
+    <dgm:linClrLst meth="repeat">
+      <a:schemeClr val="lt1"/>
+    </dgm:linClrLst>
+    <dgm:effectClrLst/>
+    <dgm:txLinClrLst/>
+    <dgm:txFillClrLst/>
+    <dgm:txEffectClrLst/>
+  </dgm:styleLbl>
+  <dgm:styleLbl name="fgImgPlace1">
+    <dgm:fillClrLst meth="repeat">
+      <a:schemeClr val="accent1">
+        <a:tint val="50000"/>
+      </a:schemeClr>
+    </dgm:fillClrLst>
+    <dgm:linClrLst meth="repeat">
+      <a:schemeClr val="lt1"/>
+    </dgm:linClrLst>
+    <dgm:effectClrLst/>
+    <dgm:txLinClrLst/>
+    <dgm:txFillClrLst meth="repeat">
+      <a:schemeClr val="lt1"/>
+    </dgm:txFillClrLst>
+    <dgm:txEffectClrLst/>
+  </dgm:styleLbl>
+  <dgm:styleLbl name="alignImgPlace1">
+    <dgm:fillClrLst meth="repeat">
+      <a:schemeClr val="accent1">
+        <a:tint val="50000"/>
+      </a:schemeClr>
+    </dgm:fillClrLst>
+    <dgm:linClrLst meth="repeat">
+      <a:schemeClr val="lt1"/>
+    </dgm:linClrLst>
+    <dgm:effectClrLst/>
+    <dgm:txLinClrLst/>
+    <dgm:txFillClrLst meth="repeat">
+      <a:schemeClr val="lt1"/>
+    </dgm:txFillClrLst>
+    <dgm:txEffectClrLst/>
+  </dgm:styleLbl>
+  <dgm:styleLbl name="bgImgPlace1">
+    <dgm:fillClrLst meth="repeat">
+      <a:schemeClr val="accent1">
+        <a:tint val="50000"/>
+      </a:schemeClr>
+    </dgm:fillClrLst>
+    <dgm:linClrLst meth="repeat">
+      <a:schemeClr val="lt1"/>
+    </dgm:linClrLst>
+    <dgm:effectClrLst/>
+    <dgm:txLinClrLst/>
+    <dgm:txFillClrLst meth="repeat">
+      <a:schemeClr val="lt1"/>
+    </dgm:txFillClrLst>
+    <dgm:txEffectClrLst/>
+  </dgm:styleLbl>
+  <dgm:styleLbl name="sibTrans2D1">
+    <dgm:fillClrLst meth="repeat">
+      <a:schemeClr val="accent1">
+        <a:tint val="60000"/>
+      </a:schemeClr>
+    </dgm:fillClrLst>
+    <dgm:linClrLst meth="repeat">
+      <a:schemeClr val="accent1">
+        <a:tint val="60000"/>
+      </a:schemeClr>
+    </dgm:linClrLst>
+    <dgm:effectClrLst/>
+    <dgm:txLinClrLst/>
+    <dgm:txFillClrLst/>
+    <dgm:txEffectClrLst/>
+  </dgm:styleLbl>
+  <dgm:styleLbl name="fgSibTrans2D1">
+    <dgm:fillClrLst meth="repeat">
+      <a:schemeClr val="accent1">
+        <a:tint val="60000"/>
+      </a:schemeClr>
+    </dgm:fillClrLst>
+    <dgm:linClrLst meth="repeat">
+      <a:schemeClr val="accent1">
+        <a:tint val="60000"/>
+      </a:schemeClr>
+    </dgm:linClrLst>
+    <dgm:effectClrLst/>
+    <dgm:txLinClrLst/>
+    <dgm:txFillClrLst/>
+    <dgm:txEffectClrLst/>
+  </dgm:styleLbl>
+  <dgm:styleLbl name="bgSibTrans2D1">
+    <dgm:fillClrLst meth="repeat">
+      <a:schemeClr val="accent1">
+        <a:tint val="60000"/>
+      </a:schemeClr>
+    </dgm:fillClrLst>
+    <dgm:linClrLst meth="repeat">
+      <a:schemeClr val="accent1">
+        <a:tint val="60000"/>
+      </a:schemeClr>
+    </dgm:linClrLst>
+    <dgm:effectClrLst/>
+    <dgm:txLinClrLst/>
+    <dgm:txFillClrLst/>
+    <dgm:txEffectClrLst/>
+  </dgm:styleLbl>
+  <dgm:styleLbl name="sibTrans1D1">
+    <dgm:fillClrLst meth="repeat">
+      <a:schemeClr val="accent1"/>
+    </dgm:fillClrLst>
+    <dgm:linClrLst meth="repeat">
+      <a:schemeClr val="accent1"/>
+    </dgm:linClrLst>
+    <dgm:effectClrLst/>
+    <dgm:txLinClrLst/>
+    <dgm:txFillClrLst meth="repeat">
+      <a:schemeClr val="tx1"/>
+    </dgm:txFillClrLst>
+    <dgm:txEffectClrLst/>
+  </dgm:styleLbl>
+  <dgm:styleLbl name="callout">
+    <dgm:fillClrLst meth="repeat">
+      <a:schemeClr val="accent1"/>
+    </dgm:fillClrLst>
+    <dgm:linClrLst meth="repeat">
+      <a:schemeClr val="accent1">
+        <a:tint val="50000"/>
+      </a:schemeClr>
+    </dgm:linClrLst>
+    <dgm:effectClrLst/>
+    <dgm:txLinClrLst/>
+    <dgm:txFillClrLst meth="repeat">
+      <a:schemeClr val="tx1"/>
+    </dgm:txFillClrLst>
+    <dgm:txEffectClrLst/>
+  </dgm:styleLbl>
+  <dgm:styleLbl name="asst0">
+    <dgm:fillClrLst meth="repeat">
+      <a:schemeClr val="accent1"/>
+    </dgm:fillClrLst>
+    <dgm:linClrLst meth="repeat">
+      <a:schemeClr val="lt1"/>
+    </dgm:linClrLst>
+    <dgm:effectClrLst/>
+    <dgm:txLinClrLst/>
+    <dgm:txFillClrLst/>
+    <dgm:txEffectClrLst/>
+  </dgm:styleLbl>
+  <dgm:styleLbl name="asst1">
+    <dgm:fillClrLst meth="repeat">
+      <a:schemeClr val="accent1"/>
+    </dgm:fillClrLst>
+    <dgm:linClrLst meth="repeat">
+      <a:schemeClr val="lt1"/>
+    </dgm:linClrLst>
+    <dgm:effectClrLst/>
+    <dgm:txLinClrLst/>
+    <dgm:txFillClrLst/>
+    <dgm:txEffectClrLst/>
+  </dgm:styleLbl>
+  <dgm:styleLbl name="asst2">
+    <dgm:fillClrLst meth="repeat">
+      <a:schemeClr val="accent1"/>
+    </dgm:fillClrLst>
+    <dgm:linClrLst meth="repeat">
+      <a:schemeClr val="lt1"/>
+    </dgm:linClrLst>
+    <dgm:effectClrLst/>
+    <dgm:txLinClrLst/>
+    <dgm:txFillClrLst/>
+    <dgm:txEffectClrLst/>
+  </dgm:styleLbl>
+  <dgm:styleLbl name="asst3">
+    <dgm:fillClrLst meth="repeat">
+      <a:schemeClr val="accent1"/>
+    </dgm:fillClrLst>
+    <dgm:linClrLst meth="repeat">
+      <a:schemeClr val="lt1"/>
+    </dgm:linClrLst>
+    <dgm:effectClrLst/>
+    <dgm:txLinClrLst/>
+    <dgm:txFillClrLst/>
+    <dgm:txEffectClrLst/>
+  </dgm:styleLbl>
+  <dgm:styleLbl name="asst4">
+    <dgm:fillClrLst meth="repeat">
+      <a:schemeClr val="accent1"/>
+    </dgm:fillClrLst>
+    <dgm:linClrLst meth="repeat">
+      <a:schemeClr val="lt1"/>
+    </dgm:linClrLst>
+    <dgm:effectClrLst/>
+    <dgm:txLinClrLst/>
+    <dgm:txFillClrLst/>
+    <dgm:txEffectClrLst/>
+  </dgm:styleLbl>
+  <dgm:styleLbl name="parChTrans2D1">
+    <dgm:fillClrLst meth="repeat">
+      <a:schemeClr val="accent1">
+        <a:tint val="60000"/>
+      </a:schemeClr>
+    </dgm:fillClrLst>
+    <dgm:linClrLst meth="repeat">
+      <a:schemeClr val="accent1">
+        <a:tint val="60000"/>
+      </a:schemeClr>
+    </dgm:linClrLst>
+    <dgm:effectClrLst/>
+    <dgm:txLinClrLst/>
+    <dgm:txFillClrLst meth="repeat">
+      <a:schemeClr val="lt1"/>
+    </dgm:txFillClrLst>
+    <dgm:txEffectClrLst/>
+  </dgm:styleLbl>
+  <dgm:styleLbl name="parChTrans2D2">
+    <dgm:fillClrLst meth="repeat">
+      <a:schemeClr val="accent1"/>
+    </dgm:fillClrLst>
+    <dgm:linClrLst meth="repeat">
+      <a:schemeClr val="accent1"/>
+    </dgm:linClrLst>
+    <dgm:effectClrLst/>
+    <dgm:txLinClrLst/>
+    <dgm:txFillClrLst meth="repeat">
+      <a:schemeClr val="lt1"/>
+    </dgm:txFillClrLst>
+    <dgm:txEffectClrLst/>
+  </dgm:styleLbl>
+  <dgm:styleLbl name="parChTrans2D3">
+    <dgm:fillClrLst meth="repeat">
+      <a:schemeClr val="accent1"/>
+    </dgm:fillClrLst>
+    <dgm:linClrLst meth="repeat">
+      <a:schemeClr val="accent1"/>
+    </dgm:linClrLst>
+    <dgm:effectClrLst/>
+    <dgm:txLinClrLst/>
+    <dgm:txFillClrLst meth="repeat">
+      <a:schemeClr val="lt1"/>
+    </dgm:txFillClrLst>
+    <dgm:txEffectClrLst/>
+  </dgm:styleLbl>
+  <dgm:styleLbl name="parChTrans2D4">
+    <dgm:fillClrLst meth="repeat">
+      <a:schemeClr val="accent1"/>
+    </dgm:fillClrLst>
+    <dgm:linClrLst meth="repeat">
+      <a:schemeClr val="accent1"/>
+    </dgm:linClrLst>
+    <dgm:effectClrLst/>
+    <dgm:txLinClrLst/>
+    <dgm:txFillClrLst meth="repeat">
+      <a:schemeClr val="lt1"/>
+    </dgm:txFillClrLst>
+    <dgm:txEffectClrLst/>
+  </dgm:styleLbl>
+  <dgm:styleLbl name="parChTrans1D1">
+    <dgm:fillClrLst meth="repeat">
+      <a:schemeClr val="accent1"/>
+    </dgm:fillClrLst>
+    <dgm:linClrLst meth="repeat">
+      <a:schemeClr val="accent1">
+        <a:shade val="60000"/>
+      </a:schemeClr>
+    </dgm:linClrLst>
+    <dgm:effectClrLst/>
+    <dgm:txLinClrLst/>
+    <dgm:txFillClrLst meth="repeat">
+      <a:schemeClr val="tx1"/>
+    </dgm:txFillClrLst>
+    <dgm:txEffectClrLst/>
+  </dgm:styleLbl>
+  <dgm:styleLbl name="parChTrans1D2">
+    <dgm:fillClrLst meth="repeat">
+      <a:schemeClr val="accent1"/>
+    </dgm:fillClrLst>
+    <dgm:linClrLst meth="repeat">
+      <a:schemeClr val="accent1">
+        <a:shade val="60000"/>
+      </a:schemeClr>
+    </dgm:linClrLst>
+    <dgm:effectClrLst/>
+    <dgm:txLinClrLst/>
+    <dgm:txFillClrLst meth="repeat">
+      <a:schemeClr val="tx1"/>
+    </dgm:txFillClrLst>
+    <dgm:txEffectClrLst/>
+  </dgm:styleLbl>
+  <dgm:styleLbl name="parChTrans1D3">
+    <dgm:fillClrLst meth="repeat">
+      <a:schemeClr val="accent1"/>
+    </dgm:fillClrLst>
+    <dgm:linClrLst meth="repeat">
+      <a:schemeClr val="accent1">
+        <a:shade val="80000"/>
+      </a:schemeClr>
+    </dgm:linClrLst>
+    <dgm:effectClrLst/>
+    <dgm:txLinClrLst/>
+    <dgm:txFillClrLst meth="repeat">
+      <a:schemeClr val="tx1"/>
+    </dgm:txFillClrLst>
+    <dgm:txEffectClrLst/>
+  </dgm:styleLbl>
+  <dgm:styleLbl name="parChTrans1D4">
+    <dgm:fillClrLst meth="repeat">
+      <a:schemeClr val="accent1"/>
+    </dgm:fillClrLst>
+    <dgm:linClrLst meth="repeat">
+      <a:schemeClr val="accent1">
+        <a:shade val="80000"/>
+      </a:schemeClr>
+    </dgm:linClrLst>
+    <dgm:effectClrLst/>
+    <dgm:txLinClrLst/>
+    <dgm:txFillClrLst meth="repeat">
+      <a:schemeClr val="tx1"/>
+    </dgm:txFillClrLst>
+    <dgm:txEffectClrLst/>
+  </dgm:styleLbl>
+  <dgm:styleLbl name="fgAcc1">
+    <dgm:fillClrLst meth="repeat">
+      <a:schemeClr val="lt1">
+        <a:alpha val="90000"/>
+      </a:schemeClr>
+    </dgm:fillClrLst>
+    <dgm:linClrLst meth="repeat">
+      <a:schemeClr val="accent1"/>
+    </dgm:linClrLst>
+    <dgm:effectClrLst/>
+    <dgm:txLinClrLst/>
+    <dgm:txFillClrLst meth="repeat">
+      <a:schemeClr val="dk1"/>
+    </dgm:txFillClrLst>
+    <dgm:txEffectClrLst/>
+  </dgm:styleLbl>
+  <dgm:styleLbl name="conFgAcc1">
+    <dgm:fillClrLst meth="repeat">
+      <a:schemeClr val="lt1">
+        <a:alpha val="90000"/>
+      </a:schemeClr>
+    </dgm:fillClrLst>
+    <dgm:linClrLst meth="repeat">
+      <a:schemeClr val="accent1"/>
+    </dgm:linClrLst>
+    <dgm:effectClrLst/>
+    <dgm:txLinClrLst/>
+    <dgm:txFillClrLst meth="repeat">
+      <a:schemeClr val="dk1"/>
+    </dgm:txFillClrLst>
+    <dgm:txEffectClrLst/>
+  </dgm:styleLbl>
+  <dgm:styleLbl name="alignAcc1">
+    <dgm:fillClrLst meth="repeat">
+      <a:schemeClr val="lt1">
+        <a:alpha val="90000"/>
+      </a:schemeClr>
+    </dgm:fillClrLst>
+    <dgm:linClrLst meth="repeat">
+      <a:schemeClr val="accent1"/>
+    </dgm:linClrLst>
+    <dgm:effectClrLst/>
+    <dgm:txLinClrLst/>
+    <dgm:txFillClrLst meth="repeat">
+      <a:schemeClr val="dk1"/>
+    </dgm:txFillClrLst>
+    <dgm:txEffectClrLst/>
+  </dgm:styleLbl>
+  <dgm:styleLbl name="trAlignAcc1">
+    <dgm:fillClrLst meth="repeat">
+      <a:schemeClr val="lt1">
+        <a:alpha val="40000"/>
+      </a:schemeClr>
+    </dgm:fillClrLst>
+    <dgm:linClrLst meth="repeat">
+      <a:schemeClr val="accent1"/>
+    </dgm:linClrLst>
+    <dgm:effectClrLst/>
+    <dgm:txLinClrLst/>
+    <dgm:txFillClrLst meth="repeat">
+      <a:schemeClr val="dk1"/>
+    </dgm:txFillClrLst>
+    <dgm:txEffectClrLst/>
+  </dgm:styleLbl>
+  <dgm:styleLbl name="bgAcc1">
+    <dgm:fillClrLst meth="repeat">
+      <a:schemeClr val="lt1">
+        <a:alpha val="90000"/>
+      </a:schemeClr>
+    </dgm:fillClrLst>
+    <dgm:linClrLst meth="repeat">
+      <a:schemeClr val="accent1"/>
+    </dgm:linClrLst>
+    <dgm:effectClrLst/>
+    <dgm:txLinClrLst/>
+    <dgm:txFillClrLst meth="repeat">
+      <a:schemeClr val="dk1"/>
+    </dgm:txFillClrLst>
+    <dgm:txEffectClrLst/>
+  </dgm:styleLbl>
+  <dgm:styleLbl name="solidFgAcc1">
+    <dgm:fillClrLst meth="repeat">
+      <a:schemeClr val="lt1"/>
+    </dgm:fillClrLst>
+    <dgm:linClrLst meth="repeat">
+      <a:schemeClr val="accent1"/>
+    </dgm:linClrLst>
+    <dgm:effectClrLst/>
+    <dgm:txLinClrLst/>
+    <dgm:txFillClrLst meth="repeat">
+      <a:schemeClr val="dk1"/>
+    </dgm:txFillClrLst>
+    <dgm:txEffectClrLst/>
+  </dgm:styleLbl>
+  <dgm:styleLbl name="solidAlignAcc1">
+    <dgm:fillClrLst meth="repeat">
+      <a:schemeClr val="lt1"/>
+    </dgm:fillClrLst>
+    <dgm:linClrLst meth="repeat">
+      <a:schemeClr val="accent1"/>
+    </dgm:linClrLst>
+    <dgm:effectClrLst/>
+    <dgm:txLinClrLst/>
+    <dgm:txFillClrLst meth="repeat">
+      <a:schemeClr val="dk1"/>
+    </dgm:txFillClrLst>
+    <dgm:txEffectClrLst/>
+  </dgm:styleLbl>
+  <dgm:styleLbl name="solidBgAcc1">
+    <dgm:fillClrLst meth="repeat">
+      <a:schemeClr val="lt1"/>
+    </dgm:fillClrLst>
+    <dgm:linClrLst meth="repeat">
+      <a:schemeClr val="accent1"/>
+    </dgm:linClrLst>
+    <dgm:effectClrLst/>
+    <dgm:txLinClrLst/>
+    <dgm:txFillClrLst meth="repeat">
+      <a:schemeClr val="dk1"/>
+    </dgm:txFillClrLst>
+    <dgm:txEffectClrLst/>
+  </dgm:styleLbl>
+  <dgm:styleLbl name="fgAccFollowNode1">
+    <dgm:fillClrLst meth="repeat">
+      <a:schemeClr val="accent1">
+        <a:alpha val="90000"/>
+        <a:tint val="40000"/>
+      </a:schemeClr>
+    </dgm:fillClrLst>
+    <dgm:linClrLst meth="repeat">
+      <a:schemeClr val="accent1">
+        <a:alpha val="90000"/>
+        <a:tint val="40000"/>
+      </a:schemeClr>
+    </dgm:linClrLst>
+    <dgm:effectClrLst/>
+    <dgm:txLinClrLst/>
+    <dgm:txFillClrLst meth="repeat">
+      <a:schemeClr val="dk1"/>
+    </dgm:txFillClrLst>
+    <dgm:txEffectClrLst/>
+  </dgm:styleLbl>
+  <dgm:styleLbl name="alignAccFollowNode1">
+    <dgm:fillClrLst meth="repeat">
+      <a:schemeClr val="accent1">
+        <a:alpha val="90000"/>
+        <a:tint val="40000"/>
+      </a:schemeClr>
+    </dgm:fillClrLst>
+    <dgm:linClrLst meth="repeat">
+      <a:schemeClr val="accent1">
+        <a:alpha val="90000"/>
+        <a:tint val="40000"/>
+      </a:schemeClr>
+    </dgm:linClrLst>
+    <dgm:effectClrLst/>
+    <dgm:txLinClrLst/>
+    <dgm:txFillClrLst meth="repeat">
+      <a:schemeClr val="dk1"/>
+    </dgm:txFillClrLst>
+    <dgm:txEffectClrLst/>
+  </dgm:styleLbl>
+  <dgm:styleLbl name="bgAccFollowNode1">
+    <dgm:fillClrLst meth="repeat">
+      <a:schemeClr val="accent1">
+        <a:alpha val="90000"/>
+        <a:tint val="40000"/>
+      </a:schemeClr>
+    </dgm:fillClrLst>
+    <dgm:linClrLst meth="repeat">
+      <a:schemeClr val="accent1">
+        <a:alpha val="90000"/>
+        <a:tint val="40000"/>
+      </a:schemeClr>
+    </dgm:linClrLst>
+    <dgm:effectClrLst/>
+    <dgm:txLinClrLst/>
+    <dgm:txFillClrLst meth="repeat">
+      <a:schemeClr val="dk1"/>
+    </dgm:txFillClrLst>
+    <dgm:txEffectClrLst/>
+  </dgm:styleLbl>
+  <dgm:styleLbl name="fgAcc0">
+    <dgm:fillClrLst meth="repeat">
+      <a:schemeClr val="lt1">
+        <a:alpha val="90000"/>
+      </a:schemeClr>
+    </dgm:fillClrLst>
+    <dgm:linClrLst meth="repeat">
+      <a:schemeClr val="accent1"/>
+    </dgm:linClrLst>
+    <dgm:effectClrLst/>
+    <dgm:txLinClrLst/>
+    <dgm:txFillClrLst meth="repeat">
+      <a:schemeClr val="dk1"/>
+    </dgm:txFillClrLst>
+    <dgm:txEffectClrLst/>
+  </dgm:styleLbl>
+  <dgm:styleLbl name="fgAcc2">
+    <dgm:fillClrLst meth="repeat">
+      <a:schemeClr val="lt1">
+        <a:alpha val="90000"/>
+      </a:schemeClr>
+    </dgm:fillClrLst>
+    <dgm:linClrLst meth="repeat">
+      <a:schemeClr val="accent1"/>
+    </dgm:linClrLst>
+    <dgm:effectClrLst/>
+    <dgm:txLinClrLst/>
+    <dgm:txFillClrLst meth="repeat">
+      <a:schemeClr val="dk1"/>
+    </dgm:txFillClrLst>
+    <dgm:txEffectClrLst/>
+  </dgm:styleLbl>
+  <dgm:styleLbl name="fgAcc3">
+    <dgm:fillClrLst meth="repeat">
+      <a:schemeClr val="lt1">
+        <a:alpha val="90000"/>
+      </a:schemeClr>
+    </dgm:fillClrLst>
+    <dgm:linClrLst meth="repeat">
+      <a:schemeClr val="accent1"/>
+    </dgm:linClrLst>
+    <dgm:effectClrLst/>
+    <dgm:txLinClrLst/>
+    <dgm:txFillClrLst meth="repeat">
+      <a:schemeClr val="dk1"/>
+    </dgm:txFillClrLst>
+    <dgm:txEffectClrLst/>
+  </dgm:styleLbl>
+  <dgm:styleLbl name="fgAcc4">
+    <dgm:fillClrLst meth="repeat">
+      <a:schemeClr val="lt1">
+        <a:alpha val="90000"/>
+      </a:schemeClr>
+    </dgm:fillClrLst>
+    <dgm:linClrLst meth="repeat">
+      <a:schemeClr val="accent1"/>
+    </dgm:linClrLst>
+    <dgm:effectClrLst/>
+    <dgm:txLinClrLst/>
+    <dgm:txFillClrLst meth="repeat">
+      <a:schemeClr val="dk1"/>
+    </dgm:txFillClrLst>
+    <dgm:txEffectClrLst/>
+  </dgm:styleLbl>
+  <dgm:styleLbl name="bgShp">
+    <dgm:fillClrLst meth="repeat">
+      <a:schemeClr val="accent1">
+        <a:tint val="40000"/>
+      </a:schemeClr>
+    </dgm:fillClrLst>
+    <dgm:linClrLst meth="repeat">
+      <a:schemeClr val="accent1"/>
+    </dgm:linClrLst>
+    <dgm:effectClrLst/>
+    <dgm:txLinClrLst/>
+    <dgm:txFillClrLst meth="repeat">
+      <a:schemeClr val="dk1"/>
+    </dgm:txFillClrLst>
+    <dgm:txEffectClrLst/>
+  </dgm:styleLbl>
+  <dgm:styleLbl name="dkBgShp">
+    <dgm:fillClrLst meth="repeat">
+      <a:schemeClr val="accent1">
+        <a:shade val="80000"/>
+      </a:schemeClr>
+    </dgm:fillClrLst>
+    <dgm:linClrLst meth="repeat">
+      <a:schemeClr val="accent1"/>
+    </dgm:linClrLst>
+    <dgm:effectClrLst/>
+    <dgm:txLinClrLst/>
+    <dgm:txFillClrLst meth="repeat">
+      <a:schemeClr val="lt1"/>
+    </dgm:txFillClrLst>
+    <dgm:txEffectClrLst/>
+  </dgm:styleLbl>
+  <dgm:styleLbl name="trBgShp">
+    <dgm:fillClrLst meth="repeat">
+      <a:schemeClr val="accent1">
+        <a:tint val="50000"/>
+        <a:alpha val="40000"/>
+      </a:schemeClr>
+    </dgm:fillClrLst>
+    <dgm:linClrLst meth="repeat">
+      <a:schemeClr val="accent1"/>
+    </dgm:linClrLst>
+    <dgm:effectClrLst/>
+    <dgm:txLinClrLst/>
+    <dgm:txFillClrLst meth="repeat">
+      <a:schemeClr val="lt1"/>
+    </dgm:txFillClrLst>
+    <dgm:txEffectClrLst/>
+  </dgm:styleLbl>
+  <dgm:styleLbl name="fgShp">
+    <dgm:fillClrLst meth="repeat">
+      <a:schemeClr val="accent1">
+        <a:tint val="60000"/>
+      </a:schemeClr>
+    </dgm:fillClrLst>
+    <dgm:linClrLst meth="repeat">
+      <a:schemeClr val="lt1"/>
+    </dgm:linClrLst>
+    <dgm:effectClrLst/>
+    <dgm:txLinClrLst/>
+    <dgm:txFillClrLst meth="repeat">
+      <a:schemeClr val="dk1"/>
+    </dgm:txFillClrLst>
+    <dgm:txEffectClrLst/>
+  </dgm:styleLbl>
+  <dgm:styleLbl name="revTx">
+    <dgm:fillClrLst meth="repeat">
+      <a:schemeClr val="lt1">
+        <a:alpha val="0"/>
+      </a:schemeClr>
+    </dgm:fillClrLst>
+    <dgm:linClrLst meth="repeat">
+      <a:schemeClr val="dk1">
+        <a:alpha val="0"/>
+      </a:schemeClr>
+    </dgm:linClrLst>
+    <dgm:effectClrLst/>
+    <dgm:txLinClrLst/>
+    <dgm:txFillClrLst meth="repeat">
+      <a:schemeClr val="tx1"/>
+    </dgm:txFillClrLst>
+    <dgm:txEffectClrLst/>
+  </dgm:styleLbl>
+</dgm:colorsDef>
+</file>
+
+<file path=ppt/diagrams/data1.xml><?xml version="1.0" encoding="utf-8"?>
+<dgm:dataModel xmlns:dgm="http://schemas.openxmlformats.org/drawingml/2006/diagram" xmlns:a="http://schemas.openxmlformats.org/drawingml/2006/main">
+  <dgm:ptLst>
+    <dgm:pt modelId="{59743959-E64A-8A4F-B00E-48C417912A9D}" type="doc">
+      <dgm:prSet loTypeId="urn:microsoft.com/office/officeart/2005/8/layout/default" loCatId="" qsTypeId="urn:microsoft.com/office/officeart/2005/8/quickstyle/simple1" qsCatId="simple" csTypeId="urn:microsoft.com/office/officeart/2005/8/colors/accent1_2" csCatId="accent1" phldr="1"/>
+      <dgm:spPr/>
+      <dgm:t>
+        <a:bodyPr/>
+        <a:lstStyle/>
+        <a:p>
+          <a:endParaRPr lang="es-ES"/>
+        </a:p>
+      </dgm:t>
+    </dgm:pt>
+    <dgm:pt modelId="{F53F36EA-2624-5C4E-A6EA-F49877D42780}">
+      <dgm:prSet phldrT="[Texto]"/>
+      <dgm:spPr/>
+      <dgm:t>
+        <a:bodyPr/>
+        <a:lstStyle/>
+        <a:p>
+          <a:r>
+            <a:rPr lang="es-ES" dirty="0"/>
+            <a:t>ejemplo</a:t>
+          </a:r>
+        </a:p>
+      </dgm:t>
+    </dgm:pt>
+    <dgm:pt modelId="{BAC08D67-6242-2742-B655-CA40F391381D}" type="parTrans" cxnId="{8E72E5C7-0666-A94F-8AC0-6968A3B1C9C5}">
+      <dgm:prSet/>
+      <dgm:spPr/>
+      <dgm:t>
+        <a:bodyPr/>
+        <a:lstStyle/>
+        <a:p>
+          <a:endParaRPr lang="es-ES"/>
+        </a:p>
+      </dgm:t>
+    </dgm:pt>
+    <dgm:pt modelId="{E1022605-A3A8-0B4F-B471-40019539CB0F}" type="sibTrans" cxnId="{8E72E5C7-0666-A94F-8AC0-6968A3B1C9C5}">
+      <dgm:prSet/>
+      <dgm:spPr/>
+      <dgm:t>
+        <a:bodyPr/>
+        <a:lstStyle/>
+        <a:p>
+          <a:endParaRPr lang="es-ES"/>
+        </a:p>
+      </dgm:t>
+    </dgm:pt>
+    <dgm:pt modelId="{43AADE84-7CBB-5147-B379-25CF664DB8CD}">
+      <dgm:prSet phldrT="[Texto]"/>
+      <dgm:spPr/>
+      <dgm:t>
+        <a:bodyPr/>
+        <a:lstStyle/>
+        <a:p>
+          <a:r>
+            <a:rPr lang="es-ES" dirty="0"/>
+            <a:t>otro</a:t>
+          </a:r>
+        </a:p>
+      </dgm:t>
+    </dgm:pt>
+    <dgm:pt modelId="{9501B4A1-B00C-9349-B181-9A991F241937}" type="parTrans" cxnId="{D6A373DD-0052-3A41-8C6F-87133E2BA9AE}">
+      <dgm:prSet/>
+      <dgm:spPr/>
+      <dgm:t>
+        <a:bodyPr/>
+        <a:lstStyle/>
+        <a:p>
+          <a:endParaRPr lang="es-ES"/>
+        </a:p>
+      </dgm:t>
+    </dgm:pt>
+    <dgm:pt modelId="{9C2E8D22-0591-4740-8350-9C4FC3CB79F0}" type="sibTrans" cxnId="{D6A373DD-0052-3A41-8C6F-87133E2BA9AE}">
+      <dgm:prSet/>
+      <dgm:spPr/>
+      <dgm:t>
+        <a:bodyPr/>
+        <a:lstStyle/>
+        <a:p>
+          <a:endParaRPr lang="es-ES"/>
+        </a:p>
+      </dgm:t>
+    </dgm:pt>
+    <dgm:pt modelId="{DD315E69-4ECA-BD44-A813-5D78066A5DB9}">
+      <dgm:prSet phldrT="[Texto]"/>
+      <dgm:spPr/>
+      <dgm:t>
+        <a:bodyPr/>
+        <a:lstStyle/>
+        <a:p>
+          <a:r>
+            <a:rPr lang="es-ES" dirty="0"/>
+            <a:t>hola que tal</a:t>
+          </a:r>
+        </a:p>
+      </dgm:t>
+    </dgm:pt>
+    <dgm:pt modelId="{8B093DE4-7C6C-114D-813D-1AABC9C7CCA4}" type="parTrans" cxnId="{333129C8-5406-E84E-82BF-90A7242638F8}">
+      <dgm:prSet/>
+      <dgm:spPr/>
+      <dgm:t>
+        <a:bodyPr/>
+        <a:lstStyle/>
+        <a:p>
+          <a:endParaRPr lang="es-ES"/>
+        </a:p>
+      </dgm:t>
+    </dgm:pt>
+    <dgm:pt modelId="{49F19DFD-9C56-BB41-9AB9-E6AB2D7A73BC}" type="sibTrans" cxnId="{333129C8-5406-E84E-82BF-90A7242638F8}">
+      <dgm:prSet/>
+      <dgm:spPr/>
+      <dgm:t>
+        <a:bodyPr/>
+        <a:lstStyle/>
+        <a:p>
+          <a:endParaRPr lang="es-ES"/>
+        </a:p>
+      </dgm:t>
+    </dgm:pt>
+    <dgm:pt modelId="{15DBD6FE-AD4D-0341-AA13-3BEAD5A3AA9D}">
+      <dgm:prSet phldrT="[Texto]"/>
+      <dgm:spPr/>
+      <dgm:t>
+        <a:bodyPr/>
+        <a:lstStyle/>
+        <a:p>
+          <a:r>
+            <a:rPr lang="es-ES" dirty="0"/>
+            <a:t>buenas tardes</a:t>
+          </a:r>
+        </a:p>
+      </dgm:t>
+    </dgm:pt>
+    <dgm:pt modelId="{ADB3C367-0905-AD49-B1B5-BA4993E36341}" type="parTrans" cxnId="{C798568C-31E0-C545-9427-C8A8B2F46A9F}">
+      <dgm:prSet/>
+      <dgm:spPr/>
+      <dgm:t>
+        <a:bodyPr/>
+        <a:lstStyle/>
+        <a:p>
+          <a:endParaRPr lang="es-ES"/>
+        </a:p>
+      </dgm:t>
+    </dgm:pt>
+    <dgm:pt modelId="{BA30467D-991C-AC42-A739-F99599017F17}" type="sibTrans" cxnId="{C798568C-31E0-C545-9427-C8A8B2F46A9F}">
+      <dgm:prSet/>
+      <dgm:spPr/>
+      <dgm:t>
+        <a:bodyPr/>
+        <a:lstStyle/>
+        <a:p>
+          <a:endParaRPr lang="es-ES"/>
+        </a:p>
+      </dgm:t>
+    </dgm:pt>
+    <dgm:pt modelId="{22D6EF5E-7481-184C-BE81-343CDC39A051}">
+      <dgm:prSet phldrT="[Texto]"/>
+      <dgm:spPr/>
+      <dgm:t>
+        <a:bodyPr/>
+        <a:lstStyle/>
+        <a:p>
+          <a:r>
+            <a:rPr lang="es-ES" dirty="0"/>
+            <a:t>buenas noches</a:t>
+          </a:r>
+        </a:p>
+      </dgm:t>
+    </dgm:pt>
+    <dgm:pt modelId="{48F006AF-7470-E442-8BE6-88127D676FFA}" type="parTrans" cxnId="{7D77A61B-82B1-A940-8585-691C29A9556D}">
+      <dgm:prSet/>
+      <dgm:spPr/>
+      <dgm:t>
+        <a:bodyPr/>
+        <a:lstStyle/>
+        <a:p>
+          <a:endParaRPr lang="es-ES"/>
+        </a:p>
+      </dgm:t>
+    </dgm:pt>
+    <dgm:pt modelId="{534E3C8B-05A7-9340-9197-E1AFF95F62DE}" type="sibTrans" cxnId="{7D77A61B-82B1-A940-8585-691C29A9556D}">
+      <dgm:prSet/>
+      <dgm:spPr/>
+      <dgm:t>
+        <a:bodyPr/>
+        <a:lstStyle/>
+        <a:p>
+          <a:endParaRPr lang="es-ES"/>
+        </a:p>
+      </dgm:t>
+    </dgm:pt>
+    <dgm:pt modelId="{48440754-9968-9C42-B7F9-5D8037839154}" type="pres">
+      <dgm:prSet presAssocID="{59743959-E64A-8A4F-B00E-48C417912A9D}" presName="diagram" presStyleCnt="0">
+        <dgm:presLayoutVars>
+          <dgm:dir/>
+          <dgm:resizeHandles val="exact"/>
+        </dgm:presLayoutVars>
+      </dgm:prSet>
+      <dgm:spPr/>
+    </dgm:pt>
+    <dgm:pt modelId="{858921A5-50B9-304C-B2AF-5EF6D77D0A7C}" type="pres">
+      <dgm:prSet presAssocID="{F53F36EA-2624-5C4E-A6EA-F49877D42780}" presName="node" presStyleLbl="node1" presStyleIdx="0" presStyleCnt="5">
+        <dgm:presLayoutVars>
+          <dgm:bulletEnabled val="1"/>
+        </dgm:presLayoutVars>
+      </dgm:prSet>
+      <dgm:spPr/>
+    </dgm:pt>
+    <dgm:pt modelId="{6AA406BC-E717-DB40-B4ED-0388DEDFF208}" type="pres">
+      <dgm:prSet presAssocID="{E1022605-A3A8-0B4F-B471-40019539CB0F}" presName="sibTrans" presStyleCnt="0"/>
+      <dgm:spPr/>
+    </dgm:pt>
+    <dgm:pt modelId="{6B1184C6-B633-3E4D-9B13-91362CCC0FFB}" type="pres">
+      <dgm:prSet presAssocID="{43AADE84-7CBB-5147-B379-25CF664DB8CD}" presName="node" presStyleLbl="node1" presStyleIdx="1" presStyleCnt="5">
+        <dgm:presLayoutVars>
+          <dgm:bulletEnabled val="1"/>
+        </dgm:presLayoutVars>
+      </dgm:prSet>
+      <dgm:spPr/>
+    </dgm:pt>
+    <dgm:pt modelId="{5565D29E-59AD-4A41-B365-EDE7180CD5CA}" type="pres">
+      <dgm:prSet presAssocID="{9C2E8D22-0591-4740-8350-9C4FC3CB79F0}" presName="sibTrans" presStyleCnt="0"/>
+      <dgm:spPr/>
+    </dgm:pt>
+    <dgm:pt modelId="{3C94BF8B-9100-FD48-9261-7F817BF95A6C}" type="pres">
+      <dgm:prSet presAssocID="{DD315E69-4ECA-BD44-A813-5D78066A5DB9}" presName="node" presStyleLbl="node1" presStyleIdx="2" presStyleCnt="5">
+        <dgm:presLayoutVars>
+          <dgm:bulletEnabled val="1"/>
+        </dgm:presLayoutVars>
+      </dgm:prSet>
+      <dgm:spPr/>
+    </dgm:pt>
+    <dgm:pt modelId="{1FF94809-4852-6043-AD8F-E29B1A2EBB94}" type="pres">
+      <dgm:prSet presAssocID="{49F19DFD-9C56-BB41-9AB9-E6AB2D7A73BC}" presName="sibTrans" presStyleCnt="0"/>
+      <dgm:spPr/>
+    </dgm:pt>
+    <dgm:pt modelId="{F5A0D509-77EB-F046-9D8C-DAF2BB0E4B67}" type="pres">
+      <dgm:prSet presAssocID="{15DBD6FE-AD4D-0341-AA13-3BEAD5A3AA9D}" presName="node" presStyleLbl="node1" presStyleIdx="3" presStyleCnt="5">
+        <dgm:presLayoutVars>
+          <dgm:bulletEnabled val="1"/>
+        </dgm:presLayoutVars>
+      </dgm:prSet>
+      <dgm:spPr/>
+    </dgm:pt>
+    <dgm:pt modelId="{55210429-FC2D-9E4D-8AB1-351D8C471B5F}" type="pres">
+      <dgm:prSet presAssocID="{BA30467D-991C-AC42-A739-F99599017F17}" presName="sibTrans" presStyleCnt="0"/>
+      <dgm:spPr/>
+    </dgm:pt>
+    <dgm:pt modelId="{A83F25C6-0EE5-8F4C-ADB8-91D6E7483447}" type="pres">
+      <dgm:prSet presAssocID="{22D6EF5E-7481-184C-BE81-343CDC39A051}" presName="node" presStyleLbl="node1" presStyleIdx="4" presStyleCnt="5">
+        <dgm:presLayoutVars>
+          <dgm:bulletEnabled val="1"/>
+        </dgm:presLayoutVars>
+      </dgm:prSet>
+      <dgm:spPr/>
+    </dgm:pt>
+  </dgm:ptLst>
+  <dgm:cxnLst>
+    <dgm:cxn modelId="{7D77A61B-82B1-A940-8585-691C29A9556D}" srcId="{59743959-E64A-8A4F-B00E-48C417912A9D}" destId="{22D6EF5E-7481-184C-BE81-343CDC39A051}" srcOrd="4" destOrd="0" parTransId="{48F006AF-7470-E442-8BE6-88127D676FFA}" sibTransId="{534E3C8B-05A7-9340-9197-E1AFF95F62DE}"/>
+    <dgm:cxn modelId="{D03CB121-5549-BF4C-9812-A41CDD12CD32}" type="presOf" srcId="{59743959-E64A-8A4F-B00E-48C417912A9D}" destId="{48440754-9968-9C42-B7F9-5D8037839154}" srcOrd="0" destOrd="0" presId="urn:microsoft.com/office/officeart/2005/8/layout/default"/>
+    <dgm:cxn modelId="{F6DF7C65-F2B8-F64F-919F-11A42C5425F8}" type="presOf" srcId="{F53F36EA-2624-5C4E-A6EA-F49877D42780}" destId="{858921A5-50B9-304C-B2AF-5EF6D77D0A7C}" srcOrd="0" destOrd="0" presId="urn:microsoft.com/office/officeart/2005/8/layout/default"/>
+    <dgm:cxn modelId="{C798568C-31E0-C545-9427-C8A8B2F46A9F}" srcId="{59743959-E64A-8A4F-B00E-48C417912A9D}" destId="{15DBD6FE-AD4D-0341-AA13-3BEAD5A3AA9D}" srcOrd="3" destOrd="0" parTransId="{ADB3C367-0905-AD49-B1B5-BA4993E36341}" sibTransId="{BA30467D-991C-AC42-A739-F99599017F17}"/>
+    <dgm:cxn modelId="{B1A174B2-94FF-9F43-B34F-934829888C26}" type="presOf" srcId="{15DBD6FE-AD4D-0341-AA13-3BEAD5A3AA9D}" destId="{F5A0D509-77EB-F046-9D8C-DAF2BB0E4B67}" srcOrd="0" destOrd="0" presId="urn:microsoft.com/office/officeart/2005/8/layout/default"/>
+    <dgm:cxn modelId="{595370C1-072B-6144-9E2F-8A0A8AE13EE7}" type="presOf" srcId="{43AADE84-7CBB-5147-B379-25CF664DB8CD}" destId="{6B1184C6-B633-3E4D-9B13-91362CCC0FFB}" srcOrd="0" destOrd="0" presId="urn:microsoft.com/office/officeart/2005/8/layout/default"/>
+    <dgm:cxn modelId="{8E72E5C7-0666-A94F-8AC0-6968A3B1C9C5}" srcId="{59743959-E64A-8A4F-B00E-48C417912A9D}" destId="{F53F36EA-2624-5C4E-A6EA-F49877D42780}" srcOrd="0" destOrd="0" parTransId="{BAC08D67-6242-2742-B655-CA40F391381D}" sibTransId="{E1022605-A3A8-0B4F-B471-40019539CB0F}"/>
+    <dgm:cxn modelId="{333129C8-5406-E84E-82BF-90A7242638F8}" srcId="{59743959-E64A-8A4F-B00E-48C417912A9D}" destId="{DD315E69-4ECA-BD44-A813-5D78066A5DB9}" srcOrd="2" destOrd="0" parTransId="{8B093DE4-7C6C-114D-813D-1AABC9C7CCA4}" sibTransId="{49F19DFD-9C56-BB41-9AB9-E6AB2D7A73BC}"/>
+    <dgm:cxn modelId="{D6A373DD-0052-3A41-8C6F-87133E2BA9AE}" srcId="{59743959-E64A-8A4F-B00E-48C417912A9D}" destId="{43AADE84-7CBB-5147-B379-25CF664DB8CD}" srcOrd="1" destOrd="0" parTransId="{9501B4A1-B00C-9349-B181-9A991F241937}" sibTransId="{9C2E8D22-0591-4740-8350-9C4FC3CB79F0}"/>
+    <dgm:cxn modelId="{FBE1C2E6-D454-F741-9DD8-2C93008C9895}" type="presOf" srcId="{DD315E69-4ECA-BD44-A813-5D78066A5DB9}" destId="{3C94BF8B-9100-FD48-9261-7F817BF95A6C}" srcOrd="0" destOrd="0" presId="urn:microsoft.com/office/officeart/2005/8/layout/default"/>
+    <dgm:cxn modelId="{A4C5AEF1-D779-B345-AEB2-5A5AE0F0AF0A}" type="presOf" srcId="{22D6EF5E-7481-184C-BE81-343CDC39A051}" destId="{A83F25C6-0EE5-8F4C-ADB8-91D6E7483447}" srcOrd="0" destOrd="0" presId="urn:microsoft.com/office/officeart/2005/8/layout/default"/>
+    <dgm:cxn modelId="{D53920D6-918A-3340-81AA-5E6D958F30D4}" type="presParOf" srcId="{48440754-9968-9C42-B7F9-5D8037839154}" destId="{858921A5-50B9-304C-B2AF-5EF6D77D0A7C}" srcOrd="0" destOrd="0" presId="urn:microsoft.com/office/officeart/2005/8/layout/default"/>
+    <dgm:cxn modelId="{45C55D92-E514-1841-B4AD-D6AF611FE9E2}" type="presParOf" srcId="{48440754-9968-9C42-B7F9-5D8037839154}" destId="{6AA406BC-E717-DB40-B4ED-0388DEDFF208}" srcOrd="1" destOrd="0" presId="urn:microsoft.com/office/officeart/2005/8/layout/default"/>
+    <dgm:cxn modelId="{30A9BDDE-B12E-F643-98B2-D9CC659C671F}" type="presParOf" srcId="{48440754-9968-9C42-B7F9-5D8037839154}" destId="{6B1184C6-B633-3E4D-9B13-91362CCC0FFB}" srcOrd="2" destOrd="0" presId="urn:microsoft.com/office/officeart/2005/8/layout/default"/>
+    <dgm:cxn modelId="{06BFBEB1-09E7-2B45-B015-98F8DBA269E4}" type="presParOf" srcId="{48440754-9968-9C42-B7F9-5D8037839154}" destId="{5565D29E-59AD-4A41-B365-EDE7180CD5CA}" srcOrd="3" destOrd="0" presId="urn:microsoft.com/office/officeart/2005/8/layout/default"/>
+    <dgm:cxn modelId="{67AA5536-41CF-3949-8748-BB1B3DABF9F4}" type="presParOf" srcId="{48440754-9968-9C42-B7F9-5D8037839154}" destId="{3C94BF8B-9100-FD48-9261-7F817BF95A6C}" srcOrd="4" destOrd="0" presId="urn:microsoft.com/office/officeart/2005/8/layout/default"/>
+    <dgm:cxn modelId="{0F927E30-EBE9-FA42-8C3D-D159D722112C}" type="presParOf" srcId="{48440754-9968-9C42-B7F9-5D8037839154}" destId="{1FF94809-4852-6043-AD8F-E29B1A2EBB94}" srcOrd="5" destOrd="0" presId="urn:microsoft.com/office/officeart/2005/8/layout/default"/>
+    <dgm:cxn modelId="{520AA179-EEA9-B444-8897-AABAACDFBBE4}" type="presParOf" srcId="{48440754-9968-9C42-B7F9-5D8037839154}" destId="{F5A0D509-77EB-F046-9D8C-DAF2BB0E4B67}" srcOrd="6" destOrd="0" presId="urn:microsoft.com/office/officeart/2005/8/layout/default"/>
+    <dgm:cxn modelId="{B0DB86DD-57F8-E64F-BF0B-B5C2970A1E26}" type="presParOf" srcId="{48440754-9968-9C42-B7F9-5D8037839154}" destId="{55210429-FC2D-9E4D-8AB1-351D8C471B5F}" srcOrd="7" destOrd="0" presId="urn:microsoft.com/office/officeart/2005/8/layout/default"/>
+    <dgm:cxn modelId="{5B12B058-E666-9542-B570-5959CBFD4D18}" type="presParOf" srcId="{48440754-9968-9C42-B7F9-5D8037839154}" destId="{A83F25C6-0EE5-8F4C-ADB8-91D6E7483447}" srcOrd="8" destOrd="0" presId="urn:microsoft.com/office/officeart/2005/8/layout/default"/>
+  </dgm:cxnLst>
+  <dgm:bg/>
+  <dgm:whole/>
+  <dgm:extLst>
+    <a:ext uri="http://schemas.microsoft.com/office/drawing/2008/diagram">
+      <dsp:dataModelExt xmlns:dsp="http://schemas.microsoft.com/office/drawing/2008/diagram" relId="rId6" minVer="http://schemas.openxmlformats.org/drawingml/2006/diagram"/>
+    </a:ext>
+  </dgm:extLst>
+</dgm:dataModel>
+</file>
+
+<file path=ppt/diagrams/drawing1.xml><?xml version="1.0" encoding="utf-8"?>
+<dsp:drawing xmlns:dgm="http://schemas.openxmlformats.org/drawingml/2006/diagram" xmlns:dsp="http://schemas.microsoft.com/office/drawing/2008/diagram" xmlns:a="http://schemas.openxmlformats.org/drawingml/2006/main">
+  <dsp:spTree>
+    <dsp:nvGrpSpPr>
+      <dsp:cNvPr id="0" name=""/>
+      <dsp:cNvGrpSpPr/>
+    </dsp:nvGrpSpPr>
+    <dsp:grpSpPr/>
+    <dsp:sp modelId="{858921A5-50B9-304C-B2AF-5EF6D77D0A7C}">
+      <dsp:nvSpPr>
+        <dsp:cNvPr id="0" name=""/>
+        <dsp:cNvSpPr/>
+      </dsp:nvSpPr>
+      <dsp:spPr>
+        <a:xfrm>
+          <a:off x="308796" y="2331"/>
+          <a:ext cx="2173337" cy="1304002"/>
+        </a:xfrm>
+        <a:prstGeom prst="rect">
+          <a:avLst/>
+        </a:prstGeom>
+        <a:solidFill>
+          <a:schemeClr val="accent1">
+            <a:hueOff val="0"/>
+            <a:satOff val="0"/>
+            <a:lumOff val="0"/>
+            <a:alphaOff val="0"/>
+          </a:schemeClr>
+        </a:solidFill>
+        <a:ln w="19050" cap="flat" cmpd="sng" algn="ctr">
+          <a:solidFill>
+            <a:schemeClr val="lt1">
+              <a:hueOff val="0"/>
+              <a:satOff val="0"/>
+              <a:lumOff val="0"/>
+              <a:alphaOff val="0"/>
+            </a:schemeClr>
+          </a:solidFill>
+          <a:prstDash val="solid"/>
+          <a:miter lim="800000"/>
+        </a:ln>
+        <a:effectLst/>
+      </dsp:spPr>
+      <dsp:style>
+        <a:lnRef idx="2">
+          <a:scrgbClr r="0" g="0" b="0"/>
+        </a:lnRef>
+        <a:fillRef idx="1">
+          <a:scrgbClr r="0" g="0" b="0"/>
+        </a:fillRef>
+        <a:effectRef idx="0">
+          <a:scrgbClr r="0" g="0" b="0"/>
+        </a:effectRef>
+        <a:fontRef idx="minor">
+          <a:schemeClr val="lt1"/>
+        </a:fontRef>
+      </dsp:style>
+      <dsp:txBody>
+        <a:bodyPr spcFirstLastPara="0" vert="horz" wrap="square" lIns="137160" tIns="137160" rIns="137160" bIns="137160" numCol="1" spcCol="1270" anchor="ctr" anchorCtr="0">
+          <a:noAutofit/>
+        </a:bodyPr>
+        <a:lstStyle/>
+        <a:p>
+          <a:pPr marL="0" lvl="0" indent="0" algn="ctr" defTabSz="1600200">
+            <a:lnSpc>
+              <a:spcPct val="90000"/>
+            </a:lnSpc>
+            <a:spcBef>
+              <a:spcPct val="0"/>
+            </a:spcBef>
+            <a:spcAft>
+              <a:spcPct val="35000"/>
+            </a:spcAft>
+            <a:buNone/>
+          </a:pPr>
+          <a:r>
+            <a:rPr lang="es-ES" sz="3600" kern="1200" dirty="0"/>
+            <a:t>ejemplo</a:t>
+          </a:r>
+        </a:p>
+      </dsp:txBody>
+      <dsp:txXfrm>
+        <a:off x="308796" y="2331"/>
+        <a:ext cx="2173337" cy="1304002"/>
+      </dsp:txXfrm>
+    </dsp:sp>
+    <dsp:sp modelId="{6B1184C6-B633-3E4D-9B13-91362CCC0FFB}">
+      <dsp:nvSpPr>
+        <dsp:cNvPr id="0" name=""/>
+        <dsp:cNvSpPr/>
+      </dsp:nvSpPr>
+      <dsp:spPr>
+        <a:xfrm>
+          <a:off x="2699466" y="2331"/>
+          <a:ext cx="2173337" cy="1304002"/>
+        </a:xfrm>
+        <a:prstGeom prst="rect">
+          <a:avLst/>
+        </a:prstGeom>
+        <a:solidFill>
+          <a:schemeClr val="accent1">
+            <a:hueOff val="0"/>
+            <a:satOff val="0"/>
+            <a:lumOff val="0"/>
+            <a:alphaOff val="0"/>
+          </a:schemeClr>
+        </a:solidFill>
+        <a:ln w="19050" cap="flat" cmpd="sng" algn="ctr">
+          <a:solidFill>
+            <a:schemeClr val="lt1">
+              <a:hueOff val="0"/>
+              <a:satOff val="0"/>
+              <a:lumOff val="0"/>
+              <a:alphaOff val="0"/>
+            </a:schemeClr>
+          </a:solidFill>
+          <a:prstDash val="solid"/>
+          <a:miter lim="800000"/>
+        </a:ln>
+        <a:effectLst/>
+      </dsp:spPr>
+      <dsp:style>
+        <a:lnRef idx="2">
+          <a:scrgbClr r="0" g="0" b="0"/>
+        </a:lnRef>
+        <a:fillRef idx="1">
+          <a:scrgbClr r="0" g="0" b="0"/>
+        </a:fillRef>
+        <a:effectRef idx="0">
+          <a:scrgbClr r="0" g="0" b="0"/>
+        </a:effectRef>
+        <a:fontRef idx="minor">
+          <a:schemeClr val="lt1"/>
+        </a:fontRef>
+      </dsp:style>
+      <dsp:txBody>
+        <a:bodyPr spcFirstLastPara="0" vert="horz" wrap="square" lIns="137160" tIns="137160" rIns="137160" bIns="137160" numCol="1" spcCol="1270" anchor="ctr" anchorCtr="0">
+          <a:noAutofit/>
+        </a:bodyPr>
+        <a:lstStyle/>
+        <a:p>
+          <a:pPr marL="0" lvl="0" indent="0" algn="ctr" defTabSz="1600200">
+            <a:lnSpc>
+              <a:spcPct val="90000"/>
+            </a:lnSpc>
+            <a:spcBef>
+              <a:spcPct val="0"/>
+            </a:spcBef>
+            <a:spcAft>
+              <a:spcPct val="35000"/>
+            </a:spcAft>
+            <a:buNone/>
+          </a:pPr>
+          <a:r>
+            <a:rPr lang="es-ES" sz="3600" kern="1200" dirty="0"/>
+            <a:t>otro</a:t>
+          </a:r>
+        </a:p>
+      </dsp:txBody>
+      <dsp:txXfrm>
+        <a:off x="2699466" y="2331"/>
+        <a:ext cx="2173337" cy="1304002"/>
+      </dsp:txXfrm>
+    </dsp:sp>
+    <dsp:sp modelId="{3C94BF8B-9100-FD48-9261-7F817BF95A6C}">
+      <dsp:nvSpPr>
+        <dsp:cNvPr id="0" name=""/>
+        <dsp:cNvSpPr/>
+      </dsp:nvSpPr>
+      <dsp:spPr>
+        <a:xfrm>
+          <a:off x="308796" y="1523667"/>
+          <a:ext cx="2173337" cy="1304002"/>
+        </a:xfrm>
+        <a:prstGeom prst="rect">
+          <a:avLst/>
+        </a:prstGeom>
+        <a:solidFill>
+          <a:schemeClr val="accent1">
+            <a:hueOff val="0"/>
+            <a:satOff val="0"/>
+            <a:lumOff val="0"/>
+            <a:alphaOff val="0"/>
+          </a:schemeClr>
+        </a:solidFill>
+        <a:ln w="19050" cap="flat" cmpd="sng" algn="ctr">
+          <a:solidFill>
+            <a:schemeClr val="lt1">
+              <a:hueOff val="0"/>
+              <a:satOff val="0"/>
+              <a:lumOff val="0"/>
+              <a:alphaOff val="0"/>
+            </a:schemeClr>
+          </a:solidFill>
+          <a:prstDash val="solid"/>
+          <a:miter lim="800000"/>
+        </a:ln>
+        <a:effectLst/>
+      </dsp:spPr>
+      <dsp:style>
+        <a:lnRef idx="2">
+          <a:scrgbClr r="0" g="0" b="0"/>
+        </a:lnRef>
+        <a:fillRef idx="1">
+          <a:scrgbClr r="0" g="0" b="0"/>
+        </a:fillRef>
+        <a:effectRef idx="0">
+          <a:scrgbClr r="0" g="0" b="0"/>
+        </a:effectRef>
+        <a:fontRef idx="minor">
+          <a:schemeClr val="lt1"/>
+        </a:fontRef>
+      </dsp:style>
+      <dsp:txBody>
+        <a:bodyPr spcFirstLastPara="0" vert="horz" wrap="square" lIns="137160" tIns="137160" rIns="137160" bIns="137160" numCol="1" spcCol="1270" anchor="ctr" anchorCtr="0">
+          <a:noAutofit/>
+        </a:bodyPr>
+        <a:lstStyle/>
+        <a:p>
+          <a:pPr marL="0" lvl="0" indent="0" algn="ctr" defTabSz="1600200">
+            <a:lnSpc>
+              <a:spcPct val="90000"/>
+            </a:lnSpc>
+            <a:spcBef>
+              <a:spcPct val="0"/>
+            </a:spcBef>
+            <a:spcAft>
+              <a:spcPct val="35000"/>
+            </a:spcAft>
+            <a:buNone/>
+          </a:pPr>
+          <a:r>
+            <a:rPr lang="es-ES" sz="3600" kern="1200" dirty="0"/>
+            <a:t>hola que tal</a:t>
+          </a:r>
+        </a:p>
+      </dsp:txBody>
+      <dsp:txXfrm>
+        <a:off x="308796" y="1523667"/>
+        <a:ext cx="2173337" cy="1304002"/>
+      </dsp:txXfrm>
+    </dsp:sp>
+    <dsp:sp modelId="{F5A0D509-77EB-F046-9D8C-DAF2BB0E4B67}">
+      <dsp:nvSpPr>
+        <dsp:cNvPr id="0" name=""/>
+        <dsp:cNvSpPr/>
+      </dsp:nvSpPr>
+      <dsp:spPr>
+        <a:xfrm>
+          <a:off x="2699466" y="1523667"/>
+          <a:ext cx="2173337" cy="1304002"/>
+        </a:xfrm>
+        <a:prstGeom prst="rect">
+          <a:avLst/>
+        </a:prstGeom>
+        <a:solidFill>
+          <a:schemeClr val="accent1">
+            <a:hueOff val="0"/>
+            <a:satOff val="0"/>
+            <a:lumOff val="0"/>
+            <a:alphaOff val="0"/>
+          </a:schemeClr>
+        </a:solidFill>
+        <a:ln w="19050" cap="flat" cmpd="sng" algn="ctr">
+          <a:solidFill>
+            <a:schemeClr val="lt1">
+              <a:hueOff val="0"/>
+              <a:satOff val="0"/>
+              <a:lumOff val="0"/>
+              <a:alphaOff val="0"/>
+            </a:schemeClr>
+          </a:solidFill>
+          <a:prstDash val="solid"/>
+          <a:miter lim="800000"/>
+        </a:ln>
+        <a:effectLst/>
+      </dsp:spPr>
+      <dsp:style>
+        <a:lnRef idx="2">
+          <a:scrgbClr r="0" g="0" b="0"/>
+        </a:lnRef>
+        <a:fillRef idx="1">
+          <a:scrgbClr r="0" g="0" b="0"/>
+        </a:fillRef>
+        <a:effectRef idx="0">
+          <a:scrgbClr r="0" g="0" b="0"/>
+        </a:effectRef>
+        <a:fontRef idx="minor">
+          <a:schemeClr val="lt1"/>
+        </a:fontRef>
+      </dsp:style>
+      <dsp:txBody>
+        <a:bodyPr spcFirstLastPara="0" vert="horz" wrap="square" lIns="137160" tIns="137160" rIns="137160" bIns="137160" numCol="1" spcCol="1270" anchor="ctr" anchorCtr="0">
+          <a:noAutofit/>
+        </a:bodyPr>
+        <a:lstStyle/>
+        <a:p>
+          <a:pPr marL="0" lvl="0" indent="0" algn="ctr" defTabSz="1600200">
+            <a:lnSpc>
+              <a:spcPct val="90000"/>
+            </a:lnSpc>
+            <a:spcBef>
+              <a:spcPct val="0"/>
+            </a:spcBef>
+            <a:spcAft>
+              <a:spcPct val="35000"/>
+            </a:spcAft>
+            <a:buNone/>
+          </a:pPr>
+          <a:r>
+            <a:rPr lang="es-ES" sz="3600" kern="1200" dirty="0"/>
+            <a:t>buenas tardes</a:t>
+          </a:r>
+        </a:p>
+      </dsp:txBody>
+      <dsp:txXfrm>
+        <a:off x="2699466" y="1523667"/>
+        <a:ext cx="2173337" cy="1304002"/>
+      </dsp:txXfrm>
+    </dsp:sp>
+    <dsp:sp modelId="{A83F25C6-0EE5-8F4C-ADB8-91D6E7483447}">
+      <dsp:nvSpPr>
+        <dsp:cNvPr id="0" name=""/>
+        <dsp:cNvSpPr/>
+      </dsp:nvSpPr>
+      <dsp:spPr>
+        <a:xfrm>
+          <a:off x="1504131" y="3045003"/>
+          <a:ext cx="2173337" cy="1304002"/>
+        </a:xfrm>
+        <a:prstGeom prst="rect">
+          <a:avLst/>
+        </a:prstGeom>
+        <a:solidFill>
+          <a:schemeClr val="accent1">
+            <a:hueOff val="0"/>
+            <a:satOff val="0"/>
+            <a:lumOff val="0"/>
+            <a:alphaOff val="0"/>
+          </a:schemeClr>
+        </a:solidFill>
+        <a:ln w="19050" cap="flat" cmpd="sng" algn="ctr">
+          <a:solidFill>
+            <a:schemeClr val="lt1">
+              <a:hueOff val="0"/>
+              <a:satOff val="0"/>
+              <a:lumOff val="0"/>
+              <a:alphaOff val="0"/>
+            </a:schemeClr>
+          </a:solidFill>
+          <a:prstDash val="solid"/>
+          <a:miter lim="800000"/>
+        </a:ln>
+        <a:effectLst/>
+      </dsp:spPr>
+      <dsp:style>
+        <a:lnRef idx="2">
+          <a:scrgbClr r="0" g="0" b="0"/>
+        </a:lnRef>
+        <a:fillRef idx="1">
+          <a:scrgbClr r="0" g="0" b="0"/>
+        </a:fillRef>
+        <a:effectRef idx="0">
+          <a:scrgbClr r="0" g="0" b="0"/>
+        </a:effectRef>
+        <a:fontRef idx="minor">
+          <a:schemeClr val="lt1"/>
+        </a:fontRef>
+      </dsp:style>
+      <dsp:txBody>
+        <a:bodyPr spcFirstLastPara="0" vert="horz" wrap="square" lIns="137160" tIns="137160" rIns="137160" bIns="137160" numCol="1" spcCol="1270" anchor="ctr" anchorCtr="0">
+          <a:noAutofit/>
+        </a:bodyPr>
+        <a:lstStyle/>
+        <a:p>
+          <a:pPr marL="0" lvl="0" indent="0" algn="ctr" defTabSz="1600200">
+            <a:lnSpc>
+              <a:spcPct val="90000"/>
+            </a:lnSpc>
+            <a:spcBef>
+              <a:spcPct val="0"/>
+            </a:spcBef>
+            <a:spcAft>
+              <a:spcPct val="35000"/>
+            </a:spcAft>
+            <a:buNone/>
+          </a:pPr>
+          <a:r>
+            <a:rPr lang="es-ES" sz="3600" kern="1200" dirty="0"/>
+            <a:t>buenas noches</a:t>
+          </a:r>
+        </a:p>
+      </dsp:txBody>
+      <dsp:txXfrm>
+        <a:off x="1504131" y="3045003"/>
+        <a:ext cx="2173337" cy="1304002"/>
+      </dsp:txXfrm>
+    </dsp:sp>
+  </dsp:spTree>
+</dsp:drawing>
+</file>
+
+<file path=ppt/diagrams/layout1.xml><?xml version="1.0" encoding="utf-8"?>
+<dgm:layoutDef xmlns:dgm="http://schemas.openxmlformats.org/drawingml/2006/diagram" xmlns:a="http://schemas.openxmlformats.org/drawingml/2006/main" uniqueId="urn:microsoft.com/office/officeart/2005/8/layout/default">
+  <dgm:title val=""/>
+  <dgm:desc val=""/>
+  <dgm:catLst>
+    <dgm:cat type="list" pri="400"/>
+  </dgm:catLst>
+  <dgm:sampData>
+    <dgm:dataModel>
+      <dgm:ptLst>
+        <dgm:pt modelId="0" type="doc"/>
+        <dgm:pt modelId="1">
+          <dgm:prSet phldr="1"/>
+        </dgm:pt>
+        <dgm:pt modelId="2">
+          <dgm:prSet phldr="1"/>
+        </dgm:pt>
+        <dgm:pt modelId="3">
+          <dgm:prSet phldr="1"/>
+        </dgm:pt>
+        <dgm:pt modelId="4">
+          <dgm:prSet phldr="1"/>
+        </dgm:pt>
+        <dgm:pt modelId="5">
+          <dgm:prSet phldr="1"/>
+        </dgm:pt>
+      </dgm:ptLst>
+      <dgm:cxnLst>
+        <dgm:cxn modelId="6" srcId="0" destId="1" srcOrd="0" destOrd="0"/>
+        <dgm:cxn modelId="7" srcId="0" destId="2" srcOrd="1" destOrd="0"/>
+        <dgm:cxn modelId="8" srcId="0" destId="3" srcOrd="2" destOrd="0"/>
+        <dgm:cxn modelId="9" srcId="0" destId="4" srcOrd="3" destOrd="0"/>
+        <dgm:cxn modelId="10" srcId="0" destId="5" srcOrd="4" destOrd="0"/>
+      </dgm:cxnLst>
+      <dgm:bg/>
+      <dgm:whole/>
+    </dgm:dataModel>
+  </dgm:sampData>
+  <dgm:styleData>
+    <dgm:dataModel>
+      <dgm:ptLst>
+        <dgm:pt modelId="0" type="doc"/>
+        <dgm:pt modelId="1"/>
+        <dgm:pt modelId="2"/>
+      </dgm:ptLst>
+      <dgm:cxnLst>
+        <dgm:cxn modelId="3" srcId="0" destId="1" srcOrd="0" destOrd="0"/>
+        <dgm:cxn modelId="4" srcId="0" destId="2" srcOrd="1" destOrd="0"/>
+      </dgm:cxnLst>
+      <dgm:bg/>
+      <dgm:whole/>
+    </dgm:dataModel>
+  </dgm:styleData>
+  <dgm:clrData>
+    <dgm:dataModel>
+      <dgm:ptLst>
+        <dgm:pt modelId="0" type="doc"/>
+        <dgm:pt modelId="1"/>
+        <dgm:pt modelId="2"/>
+        <dgm:pt modelId="3"/>
+        <dgm:pt modelId="4"/>
+        <dgm:pt modelId="5"/>
+        <dgm:pt modelId="6"/>
+      </dgm:ptLst>
+      <dgm:cxnLst>
+        <dgm:cxn modelId="7" srcId="0" destId="1" srcOrd="0" destOrd="0"/>
+        <dgm:cxn modelId="8" srcId="0" destId="2" srcOrd="1" destOrd="0"/>
+        <dgm:cxn modelId="9" srcId="0" destId="3" srcOrd="2" destOrd="0"/>
+        <dgm:cxn modelId="10" srcId="0" destId="4" srcOrd="3" destOrd="0"/>
+        <dgm:cxn modelId="11" srcId="0" destId="5" srcOrd="4" destOrd="0"/>
+        <dgm:cxn modelId="12" srcId="0" destId="6" srcOrd="5" destOrd="0"/>
+      </dgm:cxnLst>
+      <dgm:bg/>
+      <dgm:whole/>
+    </dgm:dataModel>
+  </dgm:clrData>
+  <dgm:layoutNode name="diagram">
+    <dgm:varLst>
+      <dgm:dir/>
+      <dgm:resizeHandles val="exact"/>
+    </dgm:varLst>
+    <dgm:choose name="Name0">
+      <dgm:if name="Name1" func="var" arg="dir" op="equ" val="norm">
+        <dgm:alg type="snake">
+          <dgm:param type="grDir" val="tL"/>
+          <dgm:param type="flowDir" val="row"/>
+          <dgm:param type="contDir" val="sameDir"/>
+          <dgm:param type="off" val="ctr"/>
+        </dgm:alg>
+      </dgm:if>
+      <dgm:else name="Name2">
+        <dgm:alg type="snake">
+          <dgm:param type="grDir" val="tR"/>
+          <dgm:param type="flowDir" val="row"/>
+          <dgm:param type="contDir" val="sameDir"/>
+          <dgm:param type="off" val="ctr"/>
+        </dgm:alg>
+      </dgm:else>
+    </dgm:choose>
+    <dgm:shape xmlns:r="http://schemas.openxmlformats.org/officeDocument/2006/relationships" r:blip="">
+      <dgm:adjLst/>
+    </dgm:shape>
+    <dgm:presOf/>
+    <dgm:constrLst>
+      <dgm:constr type="w" for="ch" forName="node" refType="w"/>
+      <dgm:constr type="h" for="ch" forName="node" refType="w" refFor="ch" refForName="node" fact="0.6"/>
+      <dgm:constr type="w" for="ch" forName="sibTrans" refType="w" refFor="ch" refForName="node" fact="0.1"/>
+      <dgm:constr type="sp" refType="w" refFor="ch" refForName="sibTrans"/>
+      <dgm:constr type="primFontSz" for="ch" forName="node" op="equ" val="65"/>
+    </dgm:constrLst>
+    <dgm:ruleLst/>
+    <dgm:forEach name="Name3" axis="ch" ptType="node">
+      <dgm:layoutNode name="node">
+        <dgm:varLst>
+          <dgm:bulletEnabled val="1"/>
+        </dgm:varLst>
+        <dgm:alg type="tx"/>
+        <dgm:shape xmlns:r="http://schemas.openxmlformats.org/officeDocument/2006/relationships" type="rect" r:blip="">
+          <dgm:adjLst/>
+        </dgm:shape>
+        <dgm:presOf axis="desOrSelf" ptType="node"/>
+        <dgm:constrLst>
+          <dgm:constr type="lMarg" refType="primFontSz" fact="0.3"/>
+          <dgm:constr type="rMarg" refType="primFontSz" fact="0.3"/>
+          <dgm:constr type="tMarg" refType="primFontSz" fact="0.3"/>
+          <dgm:constr type="bMarg" refType="primFontSz" fact="0.3"/>
+        </dgm:constrLst>
+        <dgm:ruleLst>
+          <dgm:rule type="primFontSz" val="5" fact="NaN" max="NaN"/>
+        </dgm:ruleLst>
+      </dgm:layoutNode>
+      <dgm:forEach name="Name4" axis="followSib" ptType="sibTrans" cnt="1">
+        <dgm:layoutNode name="sibTrans">
+          <dgm:alg type="sp"/>
+          <dgm:shape xmlns:r="http://schemas.openxmlformats.org/officeDocument/2006/relationships" r:blip="">
+            <dgm:adjLst/>
+          </dgm:shape>
+          <dgm:presOf/>
+          <dgm:constrLst/>
+          <dgm:ruleLst/>
+        </dgm:layoutNode>
+      </dgm:forEach>
+    </dgm:forEach>
+  </dgm:layoutNode>
+</dgm:layoutDef>
+</file>
+
+<file path=ppt/diagrams/quickStyle1.xml><?xml version="1.0" encoding="utf-8"?>
+<dgm:styleDef xmlns:dgm="http://schemas.openxmlformats.org/drawingml/2006/diagram" xmlns:a="http://schemas.openxmlformats.org/drawingml/2006/main" uniqueId="urn:microsoft.com/office/officeart/2005/8/quickstyle/simple1">
+  <dgm:title val=""/>
+  <dgm:desc val=""/>
+  <dgm:catLst>
+    <dgm:cat type="simple" pri="10100"/>
+  </dgm:catLst>
+  <dgm:scene3d>
+    <a:camera prst="orthographicFront"/>
+    <a:lightRig rig="threePt" dir="t"/>
+  </dgm:scene3d>
+  <dgm:styleLbl name="node0">
+    <dgm:scene3d>
+      <a:camera prst="orthographicFront"/>
+      <a:lightRig rig="threePt" dir="t"/>
+    </dgm:scene3d>
+    <dgm:sp3d/>
+    <dgm:txPr/>
+    <dgm:style>
+      <a:lnRef idx="2">
+        <a:scrgbClr r="0" g="0" b="0"/>
+      </a:lnRef>
+      <a:fillRef idx="1">
+        <a:scrgbClr r="0" g="0" b="0"/>
+      </a:fillRef>
+      <a:effectRef idx="0">
+        <a:scrgbClr r="0" g="0" b="0"/>
+      </a:effectRef>
+      <a:fontRef idx="minor">
+        <a:schemeClr val="lt1"/>
+      </a:fontRef>
+    </dgm:style>
+  </dgm:styleLbl>
+  <dgm:styleLbl name="lnNode1">
+    <dgm:scene3d>
+      <a:camera prst="orthographicFront"/>
+      <a:lightRig rig="threePt" dir="t"/>
+    </dgm:scene3d>
+    <dgm:sp3d/>
+    <dgm:txPr/>
+    <dgm:style>
+      <a:lnRef idx="2">
+        <a:scrgbClr r="0" g="0" b="0"/>
+      </a:lnRef>
+      <a:fillRef idx="1">
+        <a:scrgbClr r="0" g="0" b="0"/>
+      </a:fillRef>
+      <a:effectRef idx="0">
+        <a:scrgbClr r="0" g="0" b="0"/>
+      </a:effectRef>
+      <a:fontRef idx="minor">
+        <a:schemeClr val="lt1"/>
+      </a:fontRef>
+    </dgm:style>
+  </dgm:styleLbl>
+  <dgm:styleLbl name="vennNode1">
+    <dgm:scene3d>
+      <a:camera prst="orthographicFront"/>
+      <a:lightRig rig="threePt" dir="t"/>
+    </dgm:scene3d>
+    <dgm:sp3d/>
+    <dgm:txPr/>
+    <dgm:style>
+      <a:lnRef idx="2">
+        <a:scrgbClr r="0" g="0" b="0"/>
+      </a:lnRef>
+      <a:fillRef idx="1">
+        <a:scrgbClr r="0" g="0" b="0"/>
+      </a:fillRef>
+      <a:effectRef idx="0">
+        <a:scrgbClr r="0" g="0" b="0"/>
+      </a:effectRef>
+      <a:fontRef idx="minor">
+        <a:schemeClr val="tx1"/>
+      </a:fontRef>
+    </dgm:style>
+  </dgm:styleLbl>
+  <dgm:styleLbl name="alignNode1">
+    <dgm:scene3d>
+      <a:camera prst="orthographicFront"/>
+      <a:lightRig rig="threePt" dir="t"/>
+    </dgm:scene3d>
+    <dgm:sp3d/>
+    <dgm:txPr/>
+    <dgm:style>
+      <a:lnRef idx="2">
+        <a:scrgbClr r="0" g="0" b="0"/>
+      </a:lnRef>
+      <a:fillRef idx="1">
+        <a:scrgbClr r="0" g="0" b="0"/>
+      </a:fillRef>
+      <a:effectRef idx="0">
+        <a:scrgbClr r="0" g="0" b="0"/>
+      </a:effectRef>
+      <a:fontRef idx="minor">
+        <a:schemeClr val="lt1"/>
+      </a:fontRef>
+    </dgm:style>
+  </dgm:styleLbl>
+  <dgm:styleLbl name="node1">
+    <dgm:scene3d>
+      <a:camera prst="orthographicFront"/>
+      <a:lightRig rig="threePt" dir="t"/>
+    </dgm:scene3d>
+    <dgm:sp3d/>
+    <dgm:txPr/>
+    <dgm:style>
+      <a:lnRef idx="2">
+        <a:scrgbClr r="0" g="0" b="0"/>
+      </a:lnRef>
+      <a:fillRef idx="1">
+        <a:scrgbClr r="0" g="0" b="0"/>
+      </a:fillRef>
+      <a:effectRef idx="0">
+        <a:scrgbClr r="0" g="0" b="0"/>
+      </a:effectRef>
+      <a:fontRef idx="minor">
+        <a:schemeClr val="lt1"/>
+      </a:fontRef>
+    </dgm:style>
+  </dgm:styleLbl>
+  <dgm:styleLbl name="node2">
+    <dgm:scene3d>
+      <a:camera prst="orthographicFront"/>
+      <a:lightRig rig="threePt" dir="t"/>
+    </dgm:scene3d>
+    <dgm:sp3d/>
+    <dgm:txPr/>
+    <dgm:style>
+      <a:lnRef idx="2">
+        <a:scrgbClr r="0" g="0" b="0"/>
+      </a:lnRef>
+      <a:fillRef idx="1">
+        <a:scrgbClr r="0" g="0" b="0"/>
+      </a:fillRef>
+      <a:effectRef idx="0">
+        <a:scrgbClr r="0" g="0" b="0"/>
+      </a:effectRef>
+      <a:fontRef idx="minor">
+        <a:schemeClr val="lt1"/>
+      </a:fontRef>
+    </dgm:style>
+  </dgm:styleLbl>
+  <dgm:styleLbl name="node3">
+    <dgm:scene3d>
+      <a:camera prst="orthographicFront"/>
+      <a:lightRig rig="threePt" dir="t"/>
+    </dgm:scene3d>
+    <dgm:sp3d/>
+    <dgm:txPr/>
+    <dgm:style>
+      <a:lnRef idx="2">
+        <a:scrgbClr r="0" g="0" b="0"/>
+      </a:lnRef>
+      <a:fillRef idx="1">
+        <a:scrgbClr r="0" g="0" b="0"/>
+      </a:fillRef>
+      <a:effectRef idx="0">
+        <a:scrgbClr r="0" g="0" b="0"/>
+      </a:effectRef>
+      <a:fontRef idx="minor">
+        <a:schemeClr val="lt1"/>
+      </a:fontRef>
+    </dgm:style>
+  </dgm:styleLbl>
+  <dgm:styleLbl name="node4">
+    <dgm:scene3d>
+      <a:camera prst="orthographicFront"/>
+      <a:lightRig rig="threePt" dir="t"/>
+    </dgm:scene3d>
+    <dgm:sp3d/>
+    <dgm:txPr/>
+    <dgm:style>
+      <a:lnRef idx="2">
+        <a:scrgbClr r="0" g="0" b="0"/>
+      </a:lnRef>
+      <a:fillRef idx="1">
+        <a:scrgbClr r="0" g="0" b="0"/>
+      </a:fillRef>
+      <a:effectRef idx="0">
+        <a:scrgbClr r="0" g="0" b="0"/>
+      </a:effectRef>
+      <a:fontRef idx="minor">
+        <a:schemeClr val="lt1"/>
+      </a:fontRef>
+    </dgm:style>
+  </dgm:styleLbl>
+  <dgm:styleLbl name="fgImgPlace1">
+    <dgm:scene3d>
+      <a:camera prst="orthographicFront"/>
+      <a:lightRig rig="threePt" dir="t"/>
+    </dgm:scene3d>
+    <dgm:sp3d/>
+    <dgm:txPr/>
+    <dgm:style>
+      <a:lnRef idx="2">
+        <a:scrgbClr r="0" g="0" b="0"/>
+      </a:lnRef>
+      <a:fillRef idx="1">
+        <a:scrgbClr r="0" g="0" b="0"/>
+      </a:fillRef>
+      <a:effectRef idx="0">
+        <a:scrgbClr r="0" g="0" b="0"/>
+      </a:effectRef>
+      <a:fontRef idx="minor"/>
+    </dgm:style>
+  </dgm:styleLbl>
+  <dgm:styleLbl name="alignImgPlace1">
+    <dgm:scene3d>
+      <a:camera prst="orthographicFront"/>
+      <a:lightRig rig="threePt" dir="t"/>
+    </dgm:scene3d>
+    <dgm:sp3d/>
+    <dgm:txPr/>
+    <dgm:style>
+      <a:lnRef idx="2">
+        <a:scrgbClr r="0" g="0" b="0"/>
+      </a:lnRef>
+      <a:fillRef idx="1">
+        <a:scrgbClr r="0" g="0" b="0"/>
+      </a:fillRef>
+      <a:effectRef idx="0">
+        <a:scrgbClr r="0" g="0" b="0"/>
+      </a:effectRef>
+      <a:fontRef idx="minor"/>
+    </dgm:style>
+  </dgm:styleLbl>
+  <dgm:styleLbl name="bgImgPlace1">
+    <dgm:scene3d>
+      <a:camera prst="orthographicFront"/>
+      <a:lightRig rig="threePt" dir="t"/>
+    </dgm:scene3d>
+    <dgm:sp3d/>
+    <dgm:txPr/>
+    <dgm:style>
+      <a:lnRef idx="2">
+        <a:scrgbClr r="0" g="0" b="0"/>
+      </a:lnRef>
+      <a:fillRef idx="1">
+        <a:scrgbClr r="0" g="0" b="0"/>
+      </a:fillRef>
+      <a:effectRef idx="0">
+        <a:scrgbClr r="0" g="0" b="0"/>
+      </a:effectRef>
+      <a:fontRef idx="minor"/>
+    </dgm:style>
+  </dgm:styleLbl>
+  <dgm:styleLbl name="sibTrans2D1">
+    <dgm:scene3d>
+      <a:camera prst="orthographicFront"/>
+      <a:lightRig rig="threePt" dir="t"/>
+    </dgm:scene3d>
+    <dgm:sp3d/>
+    <dgm:txPr/>
+    <dgm:style>
+      <a:lnRef idx="0">
+        <a:scrgbClr r="0" g="0" b="0"/>
+      </a:lnRef>
+      <a:fillRef idx="1">
+        <a:scrgbClr r="0" g="0" b="0"/>
+      </a:fillRef>
+      <a:effectRef idx="0">
+        <a:scrgbClr r="0" g="0" b="0"/>
+      </a:effectRef>
+      <a:fontRef idx="minor">
+        <a:schemeClr val="lt1"/>
+      </a:fontRef>
+    </dgm:style>
+  </dgm:styleLbl>
+  <dgm:styleLbl name="fgSibTrans2D1">
+    <dgm:scene3d>
+      <a:camera prst="orthographicFront"/>
+      <a:lightRig rig="threePt" dir="t"/>
+    </dgm:scene3d>
+    <dgm:sp3d/>
+    <dgm:txPr/>
+    <dgm:style>
+      <a:lnRef idx="0">
+        <a:scrgbClr r="0" g="0" b="0"/>
+      </a:lnRef>
+      <a:fillRef idx="1">
+        <a:scrgbClr r="0" g="0" b="0"/>
+      </a:fillRef>
+      <a:effectRef idx="0">
+        <a:scrgbClr r="0" g="0" b="0"/>
+      </a:effectRef>
+      <a:fontRef idx="minor">
+        <a:schemeClr val="lt1"/>
+      </a:fontRef>
+    </dgm:style>
+  </dgm:styleLbl>
+  <dgm:styleLbl name="bgSibTrans2D1">
+    <dgm:scene3d>
+      <a:camera prst="orthographicFront"/>
+      <a:lightRig rig="threePt" dir="t"/>
+    </dgm:scene3d>
+    <dgm:sp3d/>
+    <dgm:txPr/>
+    <dgm:style>
+      <a:lnRef idx="0">
+        <a:scrgbClr r="0" g="0" b="0"/>
+      </a:lnRef>
+      <a:fillRef idx="1">
+        <a:scrgbClr r="0" g="0" b="0"/>
+      </a:fillRef>
+      <a:effectRef idx="0">
+        <a:scrgbClr r="0" g="0" b="0"/>
+      </a:effectRef>
+      <a:fontRef idx="minor">
+        <a:schemeClr val="lt1"/>
+      </a:fontRef>
+    </dgm:style>
+  </dgm:styleLbl>
+  <dgm:styleLbl name="sibTrans1D1">
+    <dgm:scene3d>
+      <a:camera prst="orthographicFront"/>
+      <a:lightRig rig="threePt" dir="t"/>
+    </dgm:scene3d>
+    <dgm:sp3d/>
+    <dgm:txPr/>
+    <dgm:style>
+      <a:lnRef idx="1">
+        <a:scrgbClr r="0" g="0" b="0"/>
+      </a:lnRef>
+      <a:fillRef idx="0">
+        <a:scrgbClr r="0" g="0" b="0"/>
+      </a:fillRef>
+      <a:effectRef idx="0">
+        <a:scrgbClr r="0" g="0" b="0"/>
+      </a:effectRef>
+      <a:fontRef idx="minor"/>
+    </dgm:style>
+  </dgm:styleLbl>
+  <dgm:styleLbl name="callout">
+    <dgm:scene3d>
+      <a:camera prst="orthographicFront"/>
+      <a:lightRig rig="threePt" dir="t"/>
+    </dgm:scene3d>
+    <dgm:sp3d/>
+    <dgm:txPr/>
+    <dgm:style>
+      <a:lnRef idx="2">
+        <a:scrgbClr r="0" g="0" b="0"/>
+      </a:lnRef>
+      <a:fillRef idx="1">
+        <a:scrgbClr r="0" g="0" b="0"/>
+      </a:fillRef>
+      <a:effectRef idx="0">
+        <a:scrgbClr r="0" g="0" b="0"/>
+      </a:effectRef>
+      <a:fontRef idx="minor"/>
+    </dgm:style>
+  </dgm:styleLbl>
+  <dgm:styleLbl name="asst0">
+    <dgm:scene3d>
+      <a:camera prst="orthographicFront"/>
+      <a:lightRig rig="threePt" dir="t"/>
+    </dgm:scene3d>
+    <dgm:sp3d/>
+    <dgm:txPr/>
+    <dgm:style>
+      <a:lnRef idx="2">
+        <a:scrgbClr r="0" g="0" b="0"/>
+      </a:lnRef>
+      <a:fillRef idx="1">
+        <a:scrgbClr r="0" g="0" b="0"/>
+      </a:fillRef>
+      <a:effectRef idx="0">
+        <a:scrgbClr r="0" g="0" b="0"/>
+      </a:effectRef>
+      <a:fontRef idx="minor">
+        <a:schemeClr val="lt1"/>
+      </a:fontRef>
+    </dgm:style>
+  </dgm:styleLbl>
+  <dgm:styleLbl name="asst1">
+    <dgm:scene3d>
+      <a:camera prst="orthographicFront"/>
+      <a:lightRig rig="threePt" dir="t"/>
+    </dgm:scene3d>
+    <dgm:sp3d/>
+    <dgm:txPr/>
+    <dgm:style>
+      <a:lnRef idx="2">
+        <a:scrgbClr r="0" g="0" b="0"/>
+      </a:lnRef>
+      <a:fillRef idx="1">
+        <a:scrgbClr r="0" g="0" b="0"/>
+      </a:fillRef>
+      <a:effectRef idx="0">
+        <a:scrgbClr r="0" g="0" b="0"/>
+      </a:effectRef>
+      <a:fontRef idx="minor">
+        <a:schemeClr val="lt1"/>
+      </a:fontRef>
+    </dgm:style>
+  </dgm:styleLbl>
+  <dgm:styleLbl name="asst2">
+    <dgm:scene3d>
+      <a:camera prst="orthographicFront"/>
+      <a:lightRig rig="threePt" dir="t"/>
+    </dgm:scene3d>
+    <dgm:sp3d/>
+    <dgm:txPr/>
+    <dgm:style>
+      <a:lnRef idx="2">
+        <a:scrgbClr r="0" g="0" b="0"/>
+      </a:lnRef>
+      <a:fillRef idx="1">
+        <a:scrgbClr r="0" g="0" b="0"/>
+      </a:fillRef>
+      <a:effectRef idx="0">
+        <a:scrgbClr r="0" g="0" b="0"/>
+      </a:effectRef>
+      <a:fontRef idx="minor">
+        <a:schemeClr val="lt1"/>
+      </a:fontRef>
+    </dgm:style>
+  </dgm:styleLbl>
+  <dgm:styleLbl name="asst3">
+    <dgm:scene3d>
+      <a:camera prst="orthographicFront"/>
+      <a:lightRig rig="threePt" dir="t"/>
+    </dgm:scene3d>
+    <dgm:sp3d/>
+    <dgm:txPr/>
+    <dgm:style>
+      <a:lnRef idx="2">
+        <a:scrgbClr r="0" g="0" b="0"/>
+      </a:lnRef>
+      <a:fillRef idx="1">
+        <a:scrgbClr r="0" g="0" b="0"/>
+      </a:fillRef>
+      <a:effectRef idx="0">
+        <a:scrgbClr r="0" g="0" b="0"/>
+      </a:effectRef>
+      <a:fontRef idx="minor">
+        <a:schemeClr val="lt1"/>
+      </a:fontRef>
+    </dgm:style>
+  </dgm:styleLbl>
+  <dgm:styleLbl name="asst4">
+    <dgm:scene3d>
+      <a:camera prst="orthographicFront"/>
+      <a:lightRig rig="threePt" dir="t"/>
+    </dgm:scene3d>
+    <dgm:sp3d/>
+    <dgm:txPr/>
+    <dgm:style>
+      <a:lnRef idx="2">
+        <a:scrgbClr r="0" g="0" b="0"/>
+      </a:lnRef>
+      <a:fillRef idx="1">
+        <a:scrgbClr r="0" g="0" b="0"/>
+      </a:fillRef>
+      <a:effectRef idx="0">
+        <a:scrgbClr r="0" g="0" b="0"/>
+      </a:effectRef>
+      <a:fontRef idx="minor">
+        <a:schemeClr val="lt1"/>
+      </a:fontRef>
+    </dgm:style>
+  </dgm:styleLbl>
+  <dgm:styleLbl name="parChTrans2D1">
+    <dgm:scene3d>
+      <a:camera prst="orthographicFront"/>
+      <a:lightRig rig="threePt" dir="t"/>
+    </dgm:scene3d>
+    <dgm:sp3d/>
+    <dgm:txPr/>
+    <dgm:style>
+      <a:lnRef idx="2">
+        <a:scrgbClr r="0" g="0" b="0"/>
+      </a:lnRef>
+      <a:fillRef idx="1">
+        <a:scrgbClr r="0" g="0" b="0"/>
+      </a:fillRef>
+      <a:effectRef idx="0">
+        <a:scrgbClr r="0" g="0" b="0"/>
+      </a:effectRef>
+      <a:fontRef idx="minor">
+        <a:schemeClr val="lt1"/>
+      </a:fontRef>
+    </dgm:style>
+  </dgm:styleLbl>
+  <dgm:styleLbl name="parChTrans2D2">
+    <dgm:scene3d>
+      <a:camera prst="orthographicFront"/>
+      <a:lightRig rig="threePt" dir="t"/>
+    </dgm:scene3d>
+    <dgm:sp3d/>
+    <dgm:txPr/>
+    <dgm:style>
+      <a:lnRef idx="2">
+        <a:scrgbClr r="0" g="0" b="0"/>
+      </a:lnRef>
+      <a:fillRef idx="1">
+        <a:scrgbClr r="0" g="0" b="0"/>
+      </a:fillRef>
+      <a:effectRef idx="0">
+        <a:scrgbClr r="0" g="0" b="0"/>
+      </a:effectRef>
+      <a:fontRef idx="minor">
+        <a:schemeClr val="lt1"/>
+      </a:fontRef>
+    </dgm:style>
+  </dgm:styleLbl>
+  <dgm:styleLbl name="parChTrans2D3">
+    <dgm:scene3d>
+      <a:camera prst="orthographicFront"/>
+      <a:lightRig rig="threePt" dir="t"/>
+    </dgm:scene3d>
+    <dgm:sp3d/>
+    <dgm:txPr/>
+    <dgm:style>
+      <a:lnRef idx="2">
+        <a:scrgbClr r="0" g="0" b="0"/>
+      </a:lnRef>
+      <a:fillRef idx="1">
+        <a:scrgbClr r="0" g="0" b="0"/>
+      </a:fillRef>
+      <a:effectRef idx="0">
+        <a:scrgbClr r="0" g="0" b="0"/>
+      </a:effectRef>
+      <a:fontRef idx="minor">
+        <a:schemeClr val="lt1"/>
+      </a:fontRef>
+    </dgm:style>
+  </dgm:styleLbl>
+  <dgm:styleLbl name="parChTrans2D4">
+    <dgm:scene3d>
+      <a:camera prst="orthographicFront"/>
+      <a:lightRig rig="threePt" dir="t"/>
+    </dgm:scene3d>
+    <dgm:sp3d/>
+    <dgm:txPr/>
+    <dgm:style>
+      <a:lnRef idx="2">
+        <a:scrgbClr r="0" g="0" b="0"/>
+      </a:lnRef>
+      <a:fillRef idx="1">
+        <a:scrgbClr r="0" g="0" b="0"/>
+      </a:fillRef>
+      <a:effectRef idx="0">
+        <a:scrgbClr r="0" g="0" b="0"/>
+      </a:effectRef>
+      <a:fontRef idx="minor">
+        <a:schemeClr val="lt1"/>
+      </a:fontRef>
+    </dgm:style>
+  </dgm:styleLbl>
+  <dgm:styleLbl name="parChTrans1D1">
+    <dgm:scene3d>
+      <a:camera prst="orthographicFront"/>
+      <a:lightRig rig="threePt" dir="t"/>
+    </dgm:scene3d>
+    <dgm:sp3d/>
+    <dgm:txPr/>
+    <dgm:style>
+      <a:lnRef idx="2">
+        <a:scrgbClr r="0" g="0" b="0"/>
+      </a:lnRef>
+      <a:fillRef idx="0">
+        <a:scrgbClr r="0" g="0" b="0"/>
+      </a:fillRef>
+      <a:effectRef idx="0">
+        <a:scrgbClr r="0" g="0" b="0"/>
+      </a:effectRef>
+      <a:fontRef idx="minor"/>
+    </dgm:style>
+  </dgm:styleLbl>
+  <dgm:styleLbl name="parChTrans1D2">
+    <dgm:scene3d>
+      <a:camera prst="orthographicFront"/>
+      <a:lightRig rig="threePt" dir="t"/>
+    </dgm:scene3d>
+    <dgm:sp3d/>
+    <dgm:txPr/>
+    <dgm:style>
+      <a:lnRef idx="2">
+        <a:scrgbClr r="0" g="0" b="0"/>
+      </a:lnRef>
+      <a:fillRef idx="0">
+        <a:scrgbClr r="0" g="0" b="0"/>
+      </a:fillRef>
+      <a:effectRef idx="0">
+        <a:scrgbClr r="0" g="0" b="0"/>
+      </a:effectRef>
+      <a:fontRef idx="minor"/>
+    </dgm:style>
+  </dgm:styleLbl>
+  <dgm:styleLbl name="parChTrans1D3">
+    <dgm:scene3d>
+      <a:camera prst="orthographicFront"/>
+      <a:lightRig rig="threePt" dir="t"/>
+    </dgm:scene3d>
+    <dgm:sp3d/>
+    <dgm:txPr/>
+    <dgm:style>
+      <a:lnRef idx="2">
+        <a:scrgbClr r="0" g="0" b="0"/>
+      </a:lnRef>
+      <a:fillRef idx="0">
+        <a:scrgbClr r="0" g="0" b="0"/>
+      </a:fillRef>
+      <a:effectRef idx="0">
+        <a:scrgbClr r="0" g="0" b="0"/>
+      </a:effectRef>
+      <a:fontRef idx="minor"/>
+    </dgm:style>
+  </dgm:styleLbl>
+  <dgm:styleLbl name="parChTrans1D4">
+    <dgm:scene3d>
+      <a:camera prst="orthographicFront"/>
+      <a:lightRig rig="threePt" dir="t"/>
+    </dgm:scene3d>
+    <dgm:sp3d/>
+    <dgm:txPr/>
+    <dgm:style>
+      <a:lnRef idx="2">
+        <a:scrgbClr r="0" g="0" b="0"/>
+      </a:lnRef>
+      <a:fillRef idx="0">
+        <a:scrgbClr r="0" g="0" b="0"/>
+      </a:fillRef>
+      <a:effectRef idx="0">
+        <a:scrgbClr r="0" g="0" b="0"/>
+      </a:effectRef>
+      <a:fontRef idx="minor"/>
+    </dgm:style>
+  </dgm:styleLbl>
+  <dgm:styleLbl name="fgAcc1">
+    <dgm:scene3d>
+      <a:camera prst="orthographicFront"/>
+      <a:lightRig rig="threePt" dir="t"/>
+    </dgm:scene3d>
+    <dgm:sp3d/>
+    <dgm:txPr/>
+    <dgm:style>
+      <a:lnRef idx="2">
+        <a:scrgbClr r="0" g="0" b="0"/>
+      </a:lnRef>
+      <a:fillRef idx="1">
+        <a:scrgbClr r="0" g="0" b="0"/>
+      </a:fillRef>
+      <a:effectRef idx="0">
+        <a:scrgbClr r="0" g="0" b="0"/>
+      </a:effectRef>
+      <a:fontRef idx="minor"/>
+    </dgm:style>
+  </dgm:styleLbl>
+  <dgm:styleLbl name="conFgAcc1">
+    <dgm:scene3d>
+      <a:camera prst="orthographicFront"/>
+      <a:lightRig rig="threePt" dir="t"/>
+    </dgm:scene3d>
+    <dgm:sp3d/>
+    <dgm:txPr/>
+    <dgm:style>
+      <a:lnRef idx="2">
+        <a:scrgbClr r="0" g="0" b="0"/>
+      </a:lnRef>
+      <a:fillRef idx="1">
+        <a:scrgbClr r="0" g="0" b="0"/>
+      </a:fillRef>
+      <a:effectRef idx="0">
+        <a:scrgbClr r="0" g="0" b="0"/>
+      </a:effectRef>
+      <a:fontRef idx="minor"/>
+    </dgm:style>
+  </dgm:styleLbl>
+  <dgm:styleLbl name="alignAcc1">
+    <dgm:scene3d>
+      <a:camera prst="orthographicFront"/>
+      <a:lightRig rig="threePt" dir="t"/>
+    </dgm:scene3d>
+    <dgm:sp3d/>
+    <dgm:txPr/>
+    <dgm:style>
+      <a:lnRef idx="2">
+        <a:scrgbClr r="0" g="0" b="0"/>
+      </a:lnRef>
+      <a:fillRef idx="1">
+        <a:scrgbClr r="0" g="0" b="0"/>
+      </a:fillRef>
+      <a:effectRef idx="0">
+        <a:scrgbClr r="0" g="0" b="0"/>
+      </a:effectRef>
+      <a:fontRef idx="minor"/>
+    </dgm:style>
+  </dgm:styleLbl>
+  <dgm:styleLbl name="trAlignAcc1">
+    <dgm:scene3d>
+      <a:camera prst="orthographicFront"/>
+      <a:lightRig rig="threePt" dir="t"/>
+    </dgm:scene3d>
+    <dgm:sp3d/>
+    <dgm:txPr/>
+    <dgm:style>
+      <a:lnRef idx="1">
+        <a:scrgbClr r="0" g="0" b="0"/>
+      </a:lnRef>
+      <a:fillRef idx="1">
+        <a:scrgbClr r="0" g="0" b="0"/>
+      </a:fillRef>
+      <a:effectRef idx="0">
+        <a:scrgbClr r="0" g="0" b="0"/>
+      </a:effectRef>
+      <a:fontRef idx="minor"/>
+    </dgm:style>
+  </dgm:styleLbl>
+  <dgm:styleLbl name="bgAcc1">
+    <dgm:scene3d>
+      <a:camera prst="orthographicFront"/>
+      <a:lightRig rig="threePt" dir="t"/>
+    </dgm:scene3d>
+    <dgm:sp3d/>
+    <dgm:txPr/>
+    <dgm:style>
+      <a:lnRef idx="2">
+        <a:scrgbClr r="0" g="0" b="0"/>
+      </a:lnRef>
+      <a:fillRef idx="1">
+        <a:scrgbClr r="0" g="0" b="0"/>
+      </a:fillRef>
+      <a:effectRef idx="0">
+        <a:scrgbClr r="0" g="0" b="0"/>
+      </a:effectRef>
+      <a:fontRef idx="minor"/>
+    </dgm:style>
+  </dgm:styleLbl>
+  <dgm:styleLbl name="solidFgAcc1">
+    <dgm:scene3d>
+      <a:camera prst="orthographicFront"/>
+      <a:lightRig rig="threePt" dir="t"/>
+    </dgm:scene3d>
+    <dgm:sp3d/>
+    <dgm:txPr/>
+    <dgm:style>
+      <a:lnRef idx="2">
+        <a:scrgbClr r="0" g="0" b="0"/>
+      </a:lnRef>
+      <a:fillRef idx="1">
+        <a:scrgbClr r="0" g="0" b="0"/>
+      </a:fillRef>
+      <a:effectRef idx="0">
+        <a:scrgbClr r="0" g="0" b="0"/>
+      </a:effectRef>
+      <a:fontRef idx="minor"/>
+    </dgm:style>
+  </dgm:styleLbl>
+  <dgm:styleLbl name="solidAlignAcc1">
+    <dgm:scene3d>
+      <a:camera prst="orthographicFront"/>
+      <a:lightRig rig="threePt" dir="t"/>
+    </dgm:scene3d>
+    <dgm:sp3d/>
+    <dgm:txPr/>
+    <dgm:style>
+      <a:lnRef idx="2">
+        <a:scrgbClr r="0" g="0" b="0"/>
+      </a:lnRef>
+      <a:fillRef idx="1">
+        <a:scrgbClr r="0" g="0" b="0"/>
+      </a:fillRef>
+      <a:effectRef idx="0">
+        <a:scrgbClr r="0" g="0" b="0"/>
+      </a:effectRef>
+      <a:fontRef idx="minor"/>
+    </dgm:style>
+  </dgm:styleLbl>
+  <dgm:styleLbl name="solidBgAcc1">
+    <dgm:scene3d>
+      <a:camera prst="orthographicFront"/>
+      <a:lightRig rig="threePt" dir="t"/>
+    </dgm:scene3d>
+    <dgm:sp3d/>
+    <dgm:txPr/>
+    <dgm:style>
+      <a:lnRef idx="2">
+        <a:scrgbClr r="0" g="0" b="0"/>
+      </a:lnRef>
+      <a:fillRef idx="1">
+        <a:scrgbClr r="0" g="0" b="0"/>
+      </a:fillRef>
+      <a:effectRef idx="0">
+        <a:scrgbClr r="0" g="0" b="0"/>
+      </a:effectRef>
+      <a:fontRef idx="minor"/>
+    </dgm:style>
+  </dgm:styleLbl>
+  <dgm:styleLbl name="fgAccFollowNode1">
+    <dgm:scene3d>
+      <a:camera prst="orthographicFront"/>
+      <a:lightRig rig="threePt" dir="t"/>
+    </dgm:scene3d>
+    <dgm:sp3d/>
+    <dgm:txPr/>
+    <dgm:style>
+      <a:lnRef idx="2">
+        <a:scrgbClr r="0" g="0" b="0"/>
+      </a:lnRef>
+      <a:fillRef idx="1">
+        <a:scrgbClr r="0" g="0" b="0"/>
+      </a:fillRef>
+      <a:effectRef idx="0">
+        <a:scrgbClr r="0" g="0" b="0"/>
+      </a:effectRef>
+      <a:fontRef idx="minor"/>
+    </dgm:style>
+  </dgm:styleLbl>
+  <dgm:styleLbl name="alignAccFollowNode1">
+    <dgm:scene3d>
+      <a:camera prst="orthographicFront"/>
+      <a:lightRig rig="threePt" dir="t"/>
+    </dgm:scene3d>
+    <dgm:sp3d/>
+    <dgm:txPr/>
+    <dgm:style>
+      <a:lnRef idx="2">
+        <a:scrgbClr r="0" g="0" b="0"/>
+      </a:lnRef>
+      <a:fillRef idx="1">
+        <a:scrgbClr r="0" g="0" b="0"/>
+      </a:fillRef>
+      <a:effectRef idx="0">
+        <a:scrgbClr r="0" g="0" b="0"/>
+      </a:effectRef>
+      <a:fontRef idx="minor"/>
+    </dgm:style>
+  </dgm:styleLbl>
+  <dgm:styleLbl name="bgAccFollowNode1">
+    <dgm:scene3d>
+      <a:camera prst="orthographicFront"/>
+      <a:lightRig rig="threePt" dir="t"/>
+    </dgm:scene3d>
+    <dgm:sp3d/>
+    <dgm:txPr/>
+    <dgm:style>
+      <a:lnRef idx="2">
+        <a:scrgbClr r="0" g="0" b="0"/>
+      </a:lnRef>
+      <a:fillRef idx="1">
+        <a:scrgbClr r="0" g="0" b="0"/>
+      </a:fillRef>
+      <a:effectRef idx="0">
+        <a:scrgbClr r="0" g="0" b="0"/>
+      </a:effectRef>
+      <a:fontRef idx="minor"/>
+    </dgm:style>
+  </dgm:styleLbl>
+  <dgm:styleLbl name="fgAcc0">
+    <dgm:scene3d>
+      <a:camera prst="orthographicFront"/>
+      <a:lightRig rig="threePt" dir="t"/>
+    </dgm:scene3d>
+    <dgm:sp3d/>
+    <dgm:txPr/>
+    <dgm:style>
+      <a:lnRef idx="2">
+        <a:scrgbClr r="0" g="0" b="0"/>
+      </a:lnRef>
+      <a:fillRef idx="1">
+        <a:scrgbClr r="0" g="0" b="0"/>
+      </a:fillRef>
+      <a:effectRef idx="0">
+        <a:scrgbClr r="0" g="0" b="0"/>
+      </a:effectRef>
+      <a:fontRef idx="minor"/>
+    </dgm:style>
+  </dgm:styleLbl>
+  <dgm:styleLbl name="fgAcc2">
+    <dgm:scene3d>
+      <a:camera prst="orthographicFront"/>
+      <a:lightRig rig="threePt" dir="t"/>
+    </dgm:scene3d>
+    <dgm:sp3d/>
+    <dgm:txPr/>
+    <dgm:style>
+      <a:lnRef idx="2">
+        <a:scrgbClr r="0" g="0" b="0"/>
+      </a:lnRef>
+      <a:fillRef idx="1">
+        <a:scrgbClr r="0" g="0" b="0"/>
+      </a:fillRef>
+      <a:effectRef idx="0">
+        <a:scrgbClr r="0" g="0" b="0"/>
+      </a:effectRef>
+      <a:fontRef idx="minor"/>
+    </dgm:style>
+  </dgm:styleLbl>
+  <dgm:styleLbl name="fgAcc3">
+    <dgm:scene3d>
+      <a:camera prst="orthographicFront"/>
+      <a:lightRig rig="threePt" dir="t"/>
+    </dgm:scene3d>
+    <dgm:sp3d/>
+    <dgm:txPr/>
+    <dgm:style>
+      <a:lnRef idx="2">
+        <a:scrgbClr r="0" g="0" b="0"/>
+      </a:lnRef>
+      <a:fillRef idx="1">
+        <a:scrgbClr r="0" g="0" b="0"/>
+      </a:fillRef>
+      <a:effectRef idx="0">
+        <a:scrgbClr r="0" g="0" b="0"/>
+      </a:effectRef>
+      <a:fontRef idx="minor"/>
+    </dgm:style>
+  </dgm:styleLbl>
+  <dgm:styleLbl name="fgAcc4">
+    <dgm:scene3d>
+      <a:camera prst="orthographicFront"/>
+      <a:lightRig rig="threePt" dir="t"/>
+    </dgm:scene3d>
+    <dgm:sp3d/>
+    <dgm:txPr/>
+    <dgm:style>
+      <a:lnRef idx="2">
+        <a:scrgbClr r="0" g="0" b="0"/>
+      </a:lnRef>
+      <a:fillRef idx="1">
+        <a:scrgbClr r="0" g="0" b="0"/>
+      </a:fillRef>
+      <a:effectRef idx="0">
+        <a:scrgbClr r="0" g="0" b="0"/>
+      </a:effectRef>
+      <a:fontRef idx="minor"/>
+    </dgm:style>
+  </dgm:styleLbl>
+  <dgm:styleLbl name="bgShp">
+    <dgm:scene3d>
+      <a:camera prst="orthographicFront"/>
+      <a:lightRig rig="threePt" dir="t"/>
+    </dgm:scene3d>
+    <dgm:sp3d/>
+    <dgm:txPr/>
+    <dgm:style>
+      <a:lnRef idx="0">
+        <a:scrgbClr r="0" g="0" b="0"/>
+      </a:lnRef>
+      <a:fillRef idx="1">
+        <a:scrgbClr r="0" g="0" b="0"/>
+      </a:fillRef>
+      <a:effectRef idx="0">
+        <a:scrgbClr r="0" g="0" b="0"/>
+      </a:effectRef>
+      <a:fontRef idx="minor"/>
+    </dgm:style>
+  </dgm:styleLbl>
+  <dgm:styleLbl name="dkBgShp">
+    <dgm:scene3d>
+      <a:camera prst="orthographicFront"/>
+      <a:lightRig rig="threePt" dir="t"/>
+    </dgm:scene3d>
+    <dgm:sp3d/>
+    <dgm:txPr/>
+    <dgm:style>
+      <a:lnRef idx="0">
+        <a:scrgbClr r="0" g="0" b="0"/>
+      </a:lnRef>
+      <a:fillRef idx="1">
+        <a:scrgbClr r="0" g="0" b="0"/>
+      </a:fillRef>
+      <a:effectRef idx="0">
+        <a:scrgbClr r="0" g="0" b="0"/>
+      </a:effectRef>
+      <a:fontRef idx="minor"/>
+    </dgm:style>
+  </dgm:styleLbl>
+  <dgm:styleLbl name="trBgShp">
+    <dgm:scene3d>
+      <a:camera prst="orthographicFront"/>
+      <a:lightRig rig="threePt" dir="t"/>
+    </dgm:scene3d>
+    <dgm:sp3d/>
+    <dgm:txPr/>
+    <dgm:style>
+      <a:lnRef idx="0">
+        <a:scrgbClr r="0" g="0" b="0"/>
+      </a:lnRef>
+      <a:fillRef idx="1">
+        <a:scrgbClr r="0" g="0" b="0"/>
+      </a:fillRef>
+      <a:effectRef idx="0">
+        <a:scrgbClr r="0" g="0" b="0"/>
+      </a:effectRef>
+      <a:fontRef idx="minor"/>
+    </dgm:style>
+  </dgm:styleLbl>
+  <dgm:styleLbl name="fgShp">
+    <dgm:scene3d>
+      <a:camera prst="orthographicFront"/>
+      <a:lightRig rig="threePt" dir="t"/>
+    </dgm:scene3d>
+    <dgm:sp3d/>
+    <dgm:txPr/>
+    <dgm:style>
+      <a:lnRef idx="2">
+        <a:scrgbClr r="0" g="0" b="0"/>
+      </a:lnRef>
+      <a:fillRef idx="1">
+        <a:scrgbClr r="0" g="0" b="0"/>
+      </a:fillRef>
+      <a:effectRef idx="0">
+        <a:scrgbClr r="0" g="0" b="0"/>
+      </a:effectRef>
+      <a:fontRef idx="minor"/>
+    </dgm:style>
+  </dgm:styleLbl>
+  <dgm:styleLbl name="revTx">
+    <dgm:scene3d>
+      <a:camera prst="orthographicFront"/>
+      <a:lightRig rig="threePt" dir="t"/>
+    </dgm:scene3d>
+    <dgm:sp3d/>
+    <dgm:txPr/>
+    <dgm:style>
+      <a:lnRef idx="0">
+        <a:scrgbClr r="0" g="0" b="0"/>
+      </a:lnRef>
+      <a:fillRef idx="0">
+        <a:scrgbClr r="0" g="0" b="0"/>
+      </a:fillRef>
+      <a:effectRef idx="0">
+        <a:scrgbClr r="0" g="0" b="0"/>
+      </a:effectRef>
+      <a:fontRef idx="minor"/>
+    </dgm:style>
+  </dgm:styleLbl>
+</dgm:styleDef>
 </file>
 
 <file path=ppt/slideLayouts/slideLayout1.xml><?xml version="1.0" encoding="utf-8"?>
@@ -255,7 +2883,7 @@
           <a:p>
             <a:fld id="{FE33B7FB-3ECD-4A17-BF55-9BC9F7290BB8}" type="datetimeFigureOut">
               <a:rPr lang="es-ES" smtClean="0"/>
-              <a:t>06/03/2025</a:t>
+              <a:t>8/3/25</a:t>
             </a:fld>
             <a:endParaRPr lang="es-ES"/>
           </a:p>
@@ -453,7 +3081,7 @@
           <a:p>
             <a:fld id="{FE33B7FB-3ECD-4A17-BF55-9BC9F7290BB8}" type="datetimeFigureOut">
               <a:rPr lang="es-ES" smtClean="0"/>
-              <a:t>06/03/2025</a:t>
+              <a:t>8/3/25</a:t>
             </a:fld>
             <a:endParaRPr lang="es-ES"/>
           </a:p>
@@ -661,7 +3289,7 @@
           <a:p>
             <a:fld id="{FE33B7FB-3ECD-4A17-BF55-9BC9F7290BB8}" type="datetimeFigureOut">
               <a:rPr lang="es-ES" smtClean="0"/>
-              <a:t>06/03/2025</a:t>
+              <a:t>8/3/25</a:t>
             </a:fld>
             <a:endParaRPr lang="es-ES"/>
           </a:p>
@@ -859,7 +3487,7 @@
           <a:p>
             <a:fld id="{FE33B7FB-3ECD-4A17-BF55-9BC9F7290BB8}" type="datetimeFigureOut">
               <a:rPr lang="es-ES" smtClean="0"/>
-              <a:t>06/03/2025</a:t>
+              <a:t>8/3/25</a:t>
             </a:fld>
             <a:endParaRPr lang="es-ES"/>
           </a:p>
@@ -1134,7 +3762,7 @@
           <a:p>
             <a:fld id="{FE33B7FB-3ECD-4A17-BF55-9BC9F7290BB8}" type="datetimeFigureOut">
               <a:rPr lang="es-ES" smtClean="0"/>
-              <a:t>06/03/2025</a:t>
+              <a:t>8/3/25</a:t>
             </a:fld>
             <a:endParaRPr lang="es-ES"/>
           </a:p>
@@ -1399,7 +4027,7 @@
           <a:p>
             <a:fld id="{FE33B7FB-3ECD-4A17-BF55-9BC9F7290BB8}" type="datetimeFigureOut">
               <a:rPr lang="es-ES" smtClean="0"/>
-              <a:t>06/03/2025</a:t>
+              <a:t>8/3/25</a:t>
             </a:fld>
             <a:endParaRPr lang="es-ES"/>
           </a:p>
@@ -1811,7 +4439,7 @@
           <a:p>
             <a:fld id="{FE33B7FB-3ECD-4A17-BF55-9BC9F7290BB8}" type="datetimeFigureOut">
               <a:rPr lang="es-ES" smtClean="0"/>
-              <a:t>06/03/2025</a:t>
+              <a:t>8/3/25</a:t>
             </a:fld>
             <a:endParaRPr lang="es-ES"/>
           </a:p>
@@ -1952,7 +4580,7 @@
           <a:p>
             <a:fld id="{FE33B7FB-3ECD-4A17-BF55-9BC9F7290BB8}" type="datetimeFigureOut">
               <a:rPr lang="es-ES" smtClean="0"/>
-              <a:t>06/03/2025</a:t>
+              <a:t>8/3/25</a:t>
             </a:fld>
             <a:endParaRPr lang="es-ES"/>
           </a:p>
@@ -2065,7 +4693,7 @@
           <a:p>
             <a:fld id="{FE33B7FB-3ECD-4A17-BF55-9BC9F7290BB8}" type="datetimeFigureOut">
               <a:rPr lang="es-ES" smtClean="0"/>
-              <a:t>06/03/2025</a:t>
+              <a:t>8/3/25</a:t>
             </a:fld>
             <a:endParaRPr lang="es-ES"/>
           </a:p>
@@ -2376,7 +5004,7 @@
           <a:p>
             <a:fld id="{FE33B7FB-3ECD-4A17-BF55-9BC9F7290BB8}" type="datetimeFigureOut">
               <a:rPr lang="es-ES" smtClean="0"/>
-              <a:t>06/03/2025</a:t>
+              <a:t>8/3/25</a:t>
             </a:fld>
             <a:endParaRPr lang="es-ES"/>
           </a:p>
@@ -2664,7 +5292,7 @@
           <a:p>
             <a:fld id="{FE33B7FB-3ECD-4A17-BF55-9BC9F7290BB8}" type="datetimeFigureOut">
               <a:rPr lang="es-ES" smtClean="0"/>
-              <a:t>06/03/2025</a:t>
+              <a:t>8/3/25</a:t>
             </a:fld>
             <a:endParaRPr lang="es-ES"/>
           </a:p>
@@ -2905,7 +5533,7 @@
           <a:p>
             <a:fld id="{FE33B7FB-3ECD-4A17-BF55-9BC9F7290BB8}" type="datetimeFigureOut">
               <a:rPr lang="es-ES" smtClean="0"/>
-              <a:t>06/03/2025</a:t>
+              <a:t>8/3/25</a:t>
             </a:fld>
             <a:endParaRPr lang="es-ES"/>
           </a:p>
@@ -3646,6 +6274,418 @@
 </p:sld>
 </file>
 
+<file path=ppt/slides/slide3.xml><?xml version="1.0" encoding="utf-8"?>
+<p:sld xmlns:a="http://schemas.openxmlformats.org/drawingml/2006/main" xmlns:r="http://schemas.openxmlformats.org/officeDocument/2006/relationships" xmlns:p="http://schemas.openxmlformats.org/presentationml/2006/main">
+  <p:cSld>
+    <p:spTree>
+      <p:nvGrpSpPr>
+        <p:cNvPr id="1" name=""/>
+        <p:cNvGrpSpPr/>
+        <p:nvPr/>
+      </p:nvGrpSpPr>
+      <p:grpSpPr>
+        <a:xfrm>
+          <a:off x="0" y="0"/>
+          <a:ext cx="0" cy="0"/>
+          <a:chOff x="0" y="0"/>
+          <a:chExt cx="0" cy="0"/>
+        </a:xfrm>
+      </p:grpSpPr>
+      <p:sp>
+        <p:nvSpPr>
+          <p:cNvPr id="2" name="Título 1">
+            <a:extLst>
+              <a:ext uri="{FF2B5EF4-FFF2-40B4-BE49-F238E27FC236}">
+                <a16:creationId xmlns:a16="http://schemas.microsoft.com/office/drawing/2014/main" id="{1BE8BAC3-729A-0D7A-BFF0-379C336C84AA}"/>
+              </a:ext>
+            </a:extLst>
+          </p:cNvPr>
+          <p:cNvSpPr>
+            <a:spLocks noGrp="1"/>
+          </p:cNvSpPr>
+          <p:nvPr>
+            <p:ph type="title"/>
+          </p:nvPr>
+        </p:nvSpPr>
+        <p:spPr/>
+        <p:txBody>
+          <a:bodyPr/>
+          <a:lstStyle/>
+          <a:p>
+            <a:r>
+              <a:rPr lang="es-ES" dirty="0"/>
+              <a:t>Cosas raras: Tablas, </a:t>
+            </a:r>
+            <a:r>
+              <a:rPr lang="es-ES" dirty="0" err="1"/>
+              <a:t>wordart</a:t>
+            </a:r>
+            <a:r>
+              <a:rPr lang="es-ES" dirty="0"/>
+              <a:t> y </a:t>
+            </a:r>
+            <a:r>
+              <a:rPr lang="es-ES" dirty="0" err="1"/>
+              <a:t>smartart</a:t>
+            </a:r>
+            <a:endParaRPr lang="es-ES" dirty="0"/>
+          </a:p>
+        </p:txBody>
+      </p:sp>
+      <p:graphicFrame>
+        <p:nvGraphicFramePr>
+          <p:cNvPr id="5" name="Marcador de contenido 4">
+            <a:extLst>
+              <a:ext uri="{FF2B5EF4-FFF2-40B4-BE49-F238E27FC236}">
+                <a16:creationId xmlns:a16="http://schemas.microsoft.com/office/drawing/2014/main" id="{4FD61318-228B-F6A9-1F45-C2D18A4AB88E}"/>
+              </a:ext>
+            </a:extLst>
+          </p:cNvPr>
+          <p:cNvGraphicFramePr>
+            <a:graphicFrameLocks noGrp="1"/>
+          </p:cNvGraphicFramePr>
+          <p:nvPr>
+            <p:ph sz="half" idx="1"/>
+            <p:extLst>
+              <p:ext uri="{D42A27DB-BD31-4B8C-83A1-F6EECF244321}">
+                <p14:modId xmlns:p14="http://schemas.microsoft.com/office/powerpoint/2010/main" val="3050466483"/>
+              </p:ext>
+            </p:extLst>
+          </p:nvPr>
+        </p:nvGraphicFramePr>
+        <p:xfrm>
+          <a:off x="838200" y="1825625"/>
+          <a:ext cx="5181600" cy="1752600"/>
+        </p:xfrm>
+        <a:graphic>
+          <a:graphicData uri="http://schemas.openxmlformats.org/drawingml/2006/table">
+            <a:tbl>
+              <a:tblPr firstRow="1" bandRow="1">
+                <a:tableStyleId>{5C22544A-7EE6-4342-B048-85BDC9FD1C3A}</a:tableStyleId>
+              </a:tblPr>
+              <a:tblGrid>
+                <a:gridCol w="1727200">
+                  <a:extLst>
+                    <a:ext uri="{9D8B030D-6E8A-4147-A177-3AD203B41FA5}">
+                      <a16:colId xmlns:a16="http://schemas.microsoft.com/office/drawing/2014/main" val="3692823880"/>
+                    </a:ext>
+                  </a:extLst>
+                </a:gridCol>
+                <a:gridCol w="1727200">
+                  <a:extLst>
+                    <a:ext uri="{9D8B030D-6E8A-4147-A177-3AD203B41FA5}">
+                      <a16:colId xmlns:a16="http://schemas.microsoft.com/office/drawing/2014/main" val="1383006305"/>
+                    </a:ext>
+                  </a:extLst>
+                </a:gridCol>
+                <a:gridCol w="1727200">
+                  <a:extLst>
+                    <a:ext uri="{9D8B030D-6E8A-4147-A177-3AD203B41FA5}">
+                      <a16:colId xmlns:a16="http://schemas.microsoft.com/office/drawing/2014/main" val="3787975485"/>
+                    </a:ext>
+                  </a:extLst>
+                </a:gridCol>
+              </a:tblGrid>
+              <a:tr h="370840">
+                <a:tc>
+                  <a:txBody>
+                    <a:bodyPr/>
+                    <a:lstStyle/>
+                    <a:p>
+                      <a:r>
+                        <a:rPr lang="es-ES" dirty="0"/>
+                        <a:t>Cabecera 1</a:t>
+                      </a:r>
+                    </a:p>
+                  </a:txBody>
+                  <a:tcPr/>
+                </a:tc>
+                <a:tc>
+                  <a:txBody>
+                    <a:bodyPr/>
+                    <a:lstStyle/>
+                    <a:p>
+                      <a:r>
+                        <a:rPr lang="es-ES" dirty="0"/>
+                        <a:t>cabecera 2</a:t>
+                      </a:r>
+                    </a:p>
+                  </a:txBody>
+                  <a:tcPr/>
+                </a:tc>
+                <a:tc>
+                  <a:txBody>
+                    <a:bodyPr/>
+                    <a:lstStyle/>
+                    <a:p>
+                      <a:r>
+                        <a:rPr lang="es-ES" dirty="0"/>
+                        <a:t>Cabecera 3</a:t>
+                      </a:r>
+                    </a:p>
+                  </a:txBody>
+                  <a:tcPr/>
+                </a:tc>
+                <a:extLst>
+                  <a:ext uri="{0D108BD9-81ED-4DB2-BD59-A6C34878D82A}">
+                    <a16:rowId xmlns:a16="http://schemas.microsoft.com/office/drawing/2014/main" val="3260285237"/>
+                  </a:ext>
+                </a:extLst>
+              </a:tr>
+              <a:tr h="370840">
+                <a:tc>
+                  <a:txBody>
+                    <a:bodyPr/>
+                    <a:lstStyle/>
+                    <a:p>
+                      <a:r>
+                        <a:rPr lang="es-ES" dirty="0"/>
+                        <a:t>Dato 1</a:t>
+                      </a:r>
+                    </a:p>
+                  </a:txBody>
+                  <a:tcPr/>
+                </a:tc>
+                <a:tc>
+                  <a:txBody>
+                    <a:bodyPr/>
+                    <a:lstStyle/>
+                    <a:p>
+                      <a:r>
+                        <a:rPr lang="es-ES" dirty="0"/>
+                        <a:t>Y otro dato</a:t>
+                      </a:r>
+                    </a:p>
+                  </a:txBody>
+                  <a:tcPr/>
+                </a:tc>
+                <a:tc>
+                  <a:txBody>
+                    <a:bodyPr/>
+                    <a:lstStyle/>
+                    <a:p>
+                      <a:r>
+                        <a:rPr lang="es-ES" dirty="0"/>
+                        <a:t>Y mas datos</a:t>
+                      </a:r>
+                    </a:p>
+                  </a:txBody>
+                  <a:tcPr/>
+                </a:tc>
+                <a:extLst>
+                  <a:ext uri="{0D108BD9-81ED-4DB2-BD59-A6C34878D82A}">
+                    <a16:rowId xmlns:a16="http://schemas.microsoft.com/office/drawing/2014/main" val="2753601226"/>
+                  </a:ext>
+                </a:extLst>
+              </a:tr>
+              <a:tr h="370840">
+                <a:tc>
+                  <a:txBody>
+                    <a:bodyPr/>
+                    <a:lstStyle/>
+                    <a:p>
+                      <a:r>
+                        <a:rPr lang="es-ES" dirty="0"/>
+                        <a:t>Una columna</a:t>
+                      </a:r>
+                    </a:p>
+                  </a:txBody>
+                  <a:tcPr/>
+                </a:tc>
+                <a:tc>
+                  <a:txBody>
+                    <a:bodyPr/>
+                    <a:lstStyle/>
+                    <a:p>
+                      <a:r>
+                        <a:rPr lang="es-ES" dirty="0"/>
+                        <a:t>Y otra columna</a:t>
+                      </a:r>
+                    </a:p>
+                  </a:txBody>
+                  <a:tcPr/>
+                </a:tc>
+                <a:tc>
+                  <a:txBody>
+                    <a:bodyPr/>
+                    <a:lstStyle/>
+                    <a:p>
+                      <a:r>
+                        <a:rPr lang="es-ES" dirty="0"/>
+                        <a:t>Y una mas</a:t>
+                      </a:r>
+                    </a:p>
+                  </a:txBody>
+                  <a:tcPr/>
+                </a:tc>
+                <a:extLst>
+                  <a:ext uri="{0D108BD9-81ED-4DB2-BD59-A6C34878D82A}">
+                    <a16:rowId xmlns:a16="http://schemas.microsoft.com/office/drawing/2014/main" val="3216247358"/>
+                  </a:ext>
+                </a:extLst>
+              </a:tr>
+              <a:tr h="370840">
+                <a:tc>
+                  <a:txBody>
+                    <a:bodyPr/>
+                    <a:lstStyle/>
+                    <a:p>
+                      <a:r>
+                        <a:rPr lang="es-ES" dirty="0"/>
+                        <a:t>Ultima fila</a:t>
+                      </a:r>
+                    </a:p>
+                  </a:txBody>
+                  <a:tcPr/>
+                </a:tc>
+                <a:tc>
+                  <a:txBody>
+                    <a:bodyPr/>
+                    <a:lstStyle/>
+                    <a:p>
+                      <a:r>
+                        <a:rPr lang="es-ES" dirty="0"/>
+                        <a:t>Columna central</a:t>
+                      </a:r>
+                    </a:p>
+                  </a:txBody>
+                  <a:tcPr/>
+                </a:tc>
+                <a:tc>
+                  <a:txBody>
+                    <a:bodyPr/>
+                    <a:lstStyle/>
+                    <a:p>
+                      <a:r>
+                        <a:rPr lang="es-ES" dirty="0"/>
+                        <a:t>Ultima celda en </a:t>
+                      </a:r>
+                      <a:r>
+                        <a:rPr lang="es-ES" b="1" dirty="0"/>
+                        <a:t>negrita</a:t>
+                      </a:r>
+                    </a:p>
+                  </a:txBody>
+                  <a:tcPr/>
+                </a:tc>
+                <a:extLst>
+                  <a:ext uri="{0D108BD9-81ED-4DB2-BD59-A6C34878D82A}">
+                    <a16:rowId xmlns:a16="http://schemas.microsoft.com/office/drawing/2014/main" val="2839276875"/>
+                  </a:ext>
+                </a:extLst>
+              </a:tr>
+            </a:tbl>
+          </a:graphicData>
+        </a:graphic>
+      </p:graphicFrame>
+      <p:graphicFrame>
+        <p:nvGraphicFramePr>
+          <p:cNvPr id="7" name="Marcador de contenido 6">
+            <a:extLst>
+              <a:ext uri="{FF2B5EF4-FFF2-40B4-BE49-F238E27FC236}">
+                <a16:creationId xmlns:a16="http://schemas.microsoft.com/office/drawing/2014/main" id="{C96A7193-854C-6481-E3B8-06D1C4B8BCCC}"/>
+              </a:ext>
+            </a:extLst>
+          </p:cNvPr>
+          <p:cNvGraphicFramePr>
+            <a:graphicFrameLocks noGrp="1"/>
+          </p:cNvGraphicFramePr>
+          <p:nvPr>
+            <p:ph sz="half" idx="2"/>
+            <p:extLst>
+              <p:ext uri="{D42A27DB-BD31-4B8C-83A1-F6EECF244321}">
+                <p14:modId xmlns:p14="http://schemas.microsoft.com/office/powerpoint/2010/main" val="1303056741"/>
+              </p:ext>
+            </p:extLst>
+          </p:nvPr>
+        </p:nvGraphicFramePr>
+        <p:xfrm>
+          <a:off x="6172200" y="1825625"/>
+          <a:ext cx="5181600" cy="4351338"/>
+        </p:xfrm>
+        <a:graphic>
+          <a:graphicData uri="http://schemas.openxmlformats.org/drawingml/2006/diagram">
+            <dgm:relIds xmlns:dgm="http://schemas.openxmlformats.org/drawingml/2006/diagram" xmlns:r="http://schemas.openxmlformats.org/officeDocument/2006/relationships" r:dm="rId2" r:lo="rId3" r:qs="rId4" r:cs="rId5"/>
+          </a:graphicData>
+        </a:graphic>
+      </p:graphicFrame>
+      <p:sp>
+        <p:nvSpPr>
+          <p:cNvPr id="6" name="Rectángulo 5">
+            <a:extLst>
+              <a:ext uri="{FF2B5EF4-FFF2-40B4-BE49-F238E27FC236}">
+                <a16:creationId xmlns:a16="http://schemas.microsoft.com/office/drawing/2014/main" id="{A9027728-A32D-132D-BC42-4D6AE60171B6}"/>
+              </a:ext>
+            </a:extLst>
+          </p:cNvPr>
+          <p:cNvSpPr/>
+          <p:nvPr/>
+        </p:nvSpPr>
+        <p:spPr>
+          <a:xfrm>
+            <a:off x="1376137" y="4694535"/>
+            <a:ext cx="6159508" cy="923330"/>
+          </a:xfrm>
+          <a:prstGeom prst="rect">
+            <a:avLst/>
+          </a:prstGeom>
+          <a:noFill/>
+        </p:spPr>
+        <p:txBody>
+          <a:bodyPr wrap="none" lIns="91440" tIns="45720" rIns="91440" bIns="45720">
+            <a:spAutoFit/>
+          </a:bodyPr>
+          <a:lstStyle/>
+          <a:p>
+            <a:pPr algn="ctr"/>
+            <a:r>
+              <a:rPr lang="es-ES" sz="5400" b="1" dirty="0">
+                <a:ln w="22225">
+                  <a:solidFill>
+                    <a:schemeClr val="accent2"/>
+                  </a:solidFill>
+                  <a:prstDash val="solid"/>
+                </a:ln>
+                <a:solidFill>
+                  <a:schemeClr val="accent2">
+                    <a:lumMod val="40000"/>
+                    <a:lumOff val="60000"/>
+                  </a:schemeClr>
+                </a:solidFill>
+              </a:rPr>
+              <a:t>Esto es una prueba</a:t>
+            </a:r>
+            <a:endParaRPr lang="es-ES" sz="5400" b="1" cap="none" spc="0" dirty="0">
+              <a:ln w="22225">
+                <a:solidFill>
+                  <a:schemeClr val="accent2"/>
+                </a:solidFill>
+                <a:prstDash val="solid"/>
+              </a:ln>
+              <a:solidFill>
+                <a:schemeClr val="accent2">
+                  <a:lumMod val="40000"/>
+                  <a:lumOff val="60000"/>
+                </a:schemeClr>
+              </a:solidFill>
+              <a:effectLst/>
+            </a:endParaRPr>
+          </a:p>
+        </p:txBody>
+      </p:sp>
+    </p:spTree>
+    <p:extLst>
+      <p:ext uri="{BB962C8B-B14F-4D97-AF65-F5344CB8AC3E}">
+        <p14:creationId xmlns:p14="http://schemas.microsoft.com/office/powerpoint/2010/main" val="2798902335"/>
+      </p:ext>
+    </p:extLst>
+  </p:cSld>
+  <p:clrMapOvr>
+    <a:masterClrMapping/>
+  </p:clrMapOvr>
+</p:sld>
+</file>
+
 <file path=ppt/theme/theme1.xml><?xml version="1.0" encoding="utf-8"?>
 <a:theme xmlns:a="http://schemas.openxmlformats.org/drawingml/2006/main" name="Tema de Office">
   <a:themeElements>

</xml_diff>